<commit_message>
Aufteilung in PPP eingetragen
</commit_message>
<xml_diff>
--- a/Notizen/Präsentation_EssentialBlog.pptx
+++ b/Notizen/Präsentation_EssentialBlog.pptx
@@ -420,12 +420,12 @@
         </c:dLbls>
         <c:gapWidth val="150"/>
         <c:shape val="cylinder"/>
-        <c:axId val="348879248"/>
-        <c:axId val="348879640"/>
+        <c:axId val="259117944"/>
+        <c:axId val="259118336"/>
         <c:axId val="0"/>
       </c:bar3DChart>
       <c:catAx>
-        <c:axId val="348879248"/>
+        <c:axId val="259117944"/>
         <c:scaling>
           <c:orientation val="minMax"/>
         </c:scaling>
@@ -460,7 +460,7 @@
             <a:endParaRPr lang="de-DE"/>
           </a:p>
         </c:txPr>
-        <c:crossAx val="348879640"/>
+        <c:crossAx val="259118336"/>
         <c:crosses val="autoZero"/>
         <c:auto val="1"/>
         <c:lblAlgn val="ctr"/>
@@ -468,7 +468,7 @@
         <c:noMultiLvlLbl val="0"/>
       </c:catAx>
       <c:valAx>
-        <c:axId val="348879640"/>
+        <c:axId val="259118336"/>
         <c:scaling>
           <c:orientation val="minMax"/>
         </c:scaling>
@@ -513,7 +513,7 @@
             <a:endParaRPr lang="de-DE"/>
           </a:p>
         </c:txPr>
-        <c:crossAx val="348879248"/>
+        <c:crossAx val="259117944"/>
         <c:crosses val="autoZero"/>
         <c:crossBetween val="between"/>
         <c:majorUnit val="1"/>
@@ -521,7 +521,6 @@
     </c:plotArea>
     <c:legend>
       <c:legendPos val="r"/>
-      <c:layout/>
       <c:overlay val="0"/>
       <c:txPr>
         <a:bodyPr/>
@@ -577,7 +576,6 @@
   </mc:AlternateContent>
   <c:chart>
     <c:title>
-      <c:layout/>
       <c:overlay val="0"/>
       <c:txPr>
         <a:bodyPr/>
@@ -670,9 +668,7 @@
             <c:showBubbleSize val="0"/>
             <c:showLeaderLines val="1"/>
             <c:extLst>
-              <c:ext xmlns:c15="http://schemas.microsoft.com/office/drawing/2012/chart" uri="{CE6537A1-D6FC-4f65-9D91-7224C49458BB}">
-                <c15:layout/>
-              </c:ext>
+              <c:ext xmlns:c15="http://schemas.microsoft.com/office/drawing/2012/chart" uri="{CE6537A1-D6FC-4f65-9D91-7224C49458BB}"/>
             </c:extLst>
           </c:dLbls>
           <c:cat>
@@ -862,7 +858,7 @@
           <a:p>
             <a:fld id="{5AB3429A-4996-4E8A-9907-26EBCB65C05D}" type="datetimeFigureOut">
               <a:rPr lang="en-US" smtClean="0"/>
-              <a:t>1/20/2015</a:t>
+              <a:t>1/24/2015</a:t>
             </a:fld>
             <a:endParaRPr lang="en-US"/>
           </a:p>
@@ -1225,7 +1221,7 @@
                 <a:ea typeface="+mn-ea"/>
                 <a:cs typeface="+mn-cs"/>
               </a:rPr>
-              <a:t>1/20/2015 9:48 PM</a:t>
+              <a:t>1/24/2015 12:07 PM</a:t>
             </a:fld>
             <a:endParaRPr lang="en-US" sz="1200" b="0" i="0">
               <a:latin typeface="Calibri"/>
@@ -1460,7 +1456,7 @@
                 <a:ea typeface="+mn-ea"/>
                 <a:cs typeface="+mn-cs"/>
               </a:rPr>
-              <a:t>1/20/2015 9:45 PM</a:t>
+              <a:t>1/24/2015 12:07 PM</a:t>
             </a:fld>
             <a:endParaRPr lang="en-US" sz="1200" b="0" i="0">
               <a:latin typeface="Calibri"/>
@@ -1685,7 +1681,7 @@
                 <a:ea typeface="+mn-ea"/>
                 <a:cs typeface="+mn-cs"/>
               </a:rPr>
-              <a:t>1/20/2015 9:45 PM</a:t>
+              <a:t>1/24/2015 12:07 PM</a:t>
             </a:fld>
             <a:endParaRPr lang="en-US" sz="1200" b="0" i="0">
               <a:latin typeface="Calibri"/>
@@ -2007,7 +2003,7 @@
                 <a:ea typeface="+mn-ea"/>
                 <a:cs typeface="+mn-cs"/>
               </a:rPr>
-              <a:t>1/20/2015 9:45 PM</a:t>
+              <a:t>1/24/2015 12:07 PM</a:t>
             </a:fld>
             <a:endParaRPr lang="en-US" sz="1200" b="0" i="0">
               <a:latin typeface="Calibri"/>
@@ -5837,11 +5833,6 @@
               </a:rPr>
               <a:t>Ein Vortrag von Team Schwarz</a:t>
             </a:r>
-            <a:endParaRPr lang="de-DE" dirty="0">
-              <a:solidFill>
-                <a:srgbClr val="000000"/>
-              </a:solidFill>
-            </a:endParaRPr>
           </a:p>
         </p:txBody>
       </p:sp>
@@ -7908,8 +7899,17 @@
             </a:pPr>
             <a:r>
               <a:rPr lang="de-DE" dirty="0"/>
-              <a:t>Das Team</a:t>
-            </a:r>
+              <a:t>Das </a:t>
+            </a:r>
+            <a:r>
+              <a:rPr lang="de-DE" dirty="0" smtClean="0"/>
+              <a:t>Team - </a:t>
+            </a:r>
+            <a:r>
+              <a:rPr lang="de-DE" dirty="0" err="1" smtClean="0"/>
+              <a:t>nfe</a:t>
+            </a:r>
+            <a:endParaRPr lang="de-DE" dirty="0"/>
           </a:p>
           <a:p>
             <a:pPr marL="514350" indent="-514350">
@@ -7918,8 +7918,17 @@
             </a:pPr>
             <a:r>
               <a:rPr lang="de-DE" dirty="0"/>
-              <a:t>Unser Thema</a:t>
-            </a:r>
+              <a:t>Unser </a:t>
+            </a:r>
+            <a:r>
+              <a:rPr lang="de-DE" dirty="0" smtClean="0"/>
+              <a:t>Thema -</a:t>
+            </a:r>
+            <a:r>
+              <a:rPr lang="de-DE" dirty="0" err="1" smtClean="0"/>
+              <a:t>nfe</a:t>
+            </a:r>
+            <a:endParaRPr lang="de-DE" dirty="0"/>
           </a:p>
           <a:p>
             <a:pPr marL="514350" indent="-514350">
@@ -7927,9 +7936,14 @@
               <a:buAutoNum type="arabicPeriod"/>
             </a:pPr>
             <a:r>
-              <a:rPr lang="de-DE" dirty="0"/>
-              <a:t>Anforderungen</a:t>
-            </a:r>
+              <a:rPr lang="de-DE" dirty="0" smtClean="0"/>
+              <a:t>Anforderungen - </a:t>
+            </a:r>
+            <a:r>
+              <a:rPr lang="de-DE" dirty="0" err="1" smtClean="0"/>
+              <a:t>nfe</a:t>
+            </a:r>
+            <a:endParaRPr lang="de-DE" dirty="0"/>
           </a:p>
           <a:p>
             <a:pPr marL="514350" indent="-514350">
@@ -7937,9 +7951,14 @@
               <a:buAutoNum type="arabicPeriod"/>
             </a:pPr>
             <a:r>
-              <a:rPr lang="de-DE" dirty="0"/>
-              <a:t>Vorgehen</a:t>
-            </a:r>
+              <a:rPr lang="de-DE" dirty="0" smtClean="0"/>
+              <a:t>Vorgehen - </a:t>
+            </a:r>
+            <a:r>
+              <a:rPr lang="de-DE" dirty="0" err="1" smtClean="0"/>
+              <a:t>mkerk</a:t>
+            </a:r>
+            <a:endParaRPr lang="de-DE" dirty="0"/>
           </a:p>
           <a:p>
             <a:pPr marL="514350" indent="-514350">
@@ -7947,9 +7966,14 @@
               <a:buAutoNum type="arabicPeriod"/>
             </a:pPr>
             <a:r>
-              <a:rPr lang="de-DE" dirty="0"/>
-              <a:t>Herausforderungen</a:t>
-            </a:r>
+              <a:rPr lang="de-DE" dirty="0" smtClean="0"/>
+              <a:t>Herausforderungen -</a:t>
+            </a:r>
+            <a:r>
+              <a:rPr lang="de-DE" dirty="0" err="1" smtClean="0"/>
+              <a:t>soch</a:t>
+            </a:r>
+            <a:endParaRPr lang="de-DE" dirty="0"/>
           </a:p>
           <a:p>
             <a:pPr marL="514350" indent="-514350">
@@ -7957,9 +7981,10 @@
               <a:buAutoNum type="arabicPeriod"/>
             </a:pPr>
             <a:r>
-              <a:rPr lang="de-DE" dirty="0"/>
-              <a:t>Ergebnis</a:t>
-            </a:r>
+              <a:rPr lang="de-DE" dirty="0" smtClean="0"/>
+              <a:t>Ergebnis - alle</a:t>
+            </a:r>
+            <a:endParaRPr lang="de-DE" dirty="0"/>
           </a:p>
           <a:p>
             <a:pPr marL="514350" indent="-514350">
@@ -7967,9 +7992,14 @@
               <a:buAutoNum type="arabicPeriod"/>
             </a:pPr>
             <a:r>
-              <a:rPr lang="de-DE" dirty="0"/>
-              <a:t>Reflektion</a:t>
-            </a:r>
+              <a:rPr lang="de-DE" dirty="0" smtClean="0"/>
+              <a:t>Reflektion - </a:t>
+            </a:r>
+            <a:r>
+              <a:rPr lang="de-DE" dirty="0" err="1" smtClean="0"/>
+              <a:t>lhu</a:t>
+            </a:r>
+            <a:endParaRPr lang="de-DE" dirty="0"/>
           </a:p>
           <a:p>
             <a:pPr marL="514350" indent="-514350">
@@ -7978,7 +8008,11 @@
             </a:pPr>
             <a:r>
               <a:rPr lang="de-DE" dirty="0" smtClean="0"/>
-              <a:t>Rückmeldung</a:t>
+              <a:t>Rückmeldung - </a:t>
+            </a:r>
+            <a:r>
+              <a:rPr lang="de-DE" dirty="0" err="1" smtClean="0"/>
+              <a:t>lhu</a:t>
             </a:r>
             <a:endParaRPr lang="de-DE" dirty="0"/>
           </a:p>
@@ -8868,7 +8902,7 @@
         <p:spPr>
           <a:xfrm>
             <a:off x="381000" y="1772816"/>
-            <a:ext cx="8382000" cy="443198"/>
+            <a:ext cx="8382000" cy="984885"/>
           </a:xfrm>
         </p:spPr>
         <p:txBody>
@@ -8877,8 +8911,17 @@
           <a:p>
             <a:r>
               <a:rPr lang="de-DE" dirty="0" smtClean="0"/>
-              <a:t>Vorstellung des Projektteams</a:t>
-            </a:r>
+              <a:t>Vorstellung des </a:t>
+            </a:r>
+            <a:r>
+              <a:rPr lang="de-DE" dirty="0" smtClean="0"/>
+              <a:t>Projektteams</a:t>
+            </a:r>
+          </a:p>
+          <a:p>
+            <a:pPr marL="0" indent="0">
+              <a:buNone/>
+            </a:pPr>
             <a:endParaRPr lang="de-DE" dirty="0"/>
           </a:p>
         </p:txBody>

</xml_diff>

<commit_message>
Team, Thema und Anforderungen in die Präsi
</commit_message>
<xml_diff>
--- a/Notizen/Präsentation_EssentialBlog.pptx
+++ b/Notizen/Präsentation_EssentialBlog.pptx
@@ -142,7 +142,7 @@
   </p:defaultTextStyle>
   <p:extLst>
     <p:ext uri="{EFAFB233-063F-42B5-8137-9DF3F51BA10A}">
-      <p15:sldGuideLst xmlns:p15="http://schemas.microsoft.com/office/powerpoint/2012/main" xmlns="">
+      <p15:sldGuideLst xmlns:p15="http://schemas.microsoft.com/office/powerpoint/2012/main">
         <p15:guide id="1" orient="horz" pos="2160">
           <p15:clr>
             <a:srgbClr val="A4A3A4"/>
@@ -167,13 +167,26 @@
 
 <file path=ppt/charts/chart1.xml><?xml version="1.0" encoding="utf-8"?>
 <c:chartSpace xmlns:c="http://schemas.openxmlformats.org/drawingml/2006/chart" xmlns:a="http://schemas.openxmlformats.org/drawingml/2006/main" xmlns:r="http://schemas.openxmlformats.org/officeDocument/2006/relationships">
+  <c:date1904 val="0"/>
   <c:lang val="de-DE"/>
-  <c:style val="18"/>
+  <c:roundedCorners val="0"/>
+  <mc:AlternateContent xmlns:mc="http://schemas.openxmlformats.org/markup-compatibility/2006">
+    <mc:Choice xmlns:c14="http://schemas.microsoft.com/office/drawing/2007/8/2/chart" Requires="c14">
+      <c14:style val="118"/>
+    </mc:Choice>
+    <mc:Fallback>
+      <c:style val="18"/>
+    </mc:Fallback>
+  </mc:AlternateContent>
   <c:chart>
+    <c:autoTitleDeleted val="0"/>
     <c:view3D>
+      <c:rotX val="15"/>
+      <c:rotY val="20"/>
       <c:rAngAx val="1"/>
     </c:view3D>
     <c:floor>
+      <c:thickness val="0"/>
       <c:spPr>
         <a:solidFill>
           <a:srgbClr val="000000">
@@ -188,6 +201,7 @@
       </c:spPr>
     </c:floor>
     <c:sideWall>
+      <c:thickness val="0"/>
       <c:spPr>
         <a:gradFill>
           <a:gsLst>
@@ -212,6 +226,7 @@
       </c:spPr>
     </c:sideWall>
     <c:backWall>
+      <c:thickness val="0"/>
       <c:spPr>
         <a:gradFill>
           <a:gsLst>
@@ -240,6 +255,7 @@
       <c:bar3DChart>
         <c:barDir val="col"/>
         <c:grouping val="clustered"/>
+        <c:varyColors val="0"/>
         <c:ser>
           <c:idx val="0"/>
           <c:order val="0"/>
@@ -254,6 +270,7 @@
               </c:strCache>
             </c:strRef>
           </c:tx>
+          <c:invertIfNegative val="0"/>
           <c:cat>
             <c:strRef>
               <c:f>Sheet1!$A$2:$A$5</c:f>
@@ -310,6 +327,7 @@
               </c:strCache>
             </c:strRef>
           </c:tx>
+          <c:invertIfNegative val="0"/>
           <c:cat>
             <c:strRef>
               <c:f>Sheet1!$A$2:$A$5</c:f>
@@ -366,6 +384,7 @@
               </c:strCache>
             </c:strRef>
           </c:tx>
+          <c:invertIfNegative val="0"/>
           <c:cat>
             <c:strRef>
               <c:f>Sheet1!$A$2:$A$5</c:f>
@@ -408,19 +427,30 @@
             </c:numRef>
           </c:val>
         </c:ser>
-        <c:dLbls/>
+        <c:dLbls>
+          <c:showLegendKey val="0"/>
+          <c:showVal val="0"/>
+          <c:showCatName val="0"/>
+          <c:showSerName val="0"/>
+          <c:showPercent val="0"/>
+          <c:showBubbleSize val="0"/>
+        </c:dLbls>
+        <c:gapWidth val="150"/>
         <c:shape val="cylinder"/>
-        <c:axId val="90806912"/>
-        <c:axId val="90829184"/>
+        <c:axId val="302905680"/>
+        <c:axId val="302906072"/>
         <c:axId val="0"/>
       </c:bar3DChart>
       <c:catAx>
-        <c:axId val="90806912"/>
+        <c:axId val="302905680"/>
         <c:scaling>
           <c:orientation val="minMax"/>
         </c:scaling>
+        <c:delete val="0"/>
         <c:axPos val="b"/>
         <c:numFmt formatCode="General" sourceLinked="0"/>
+        <c:majorTickMark val="out"/>
+        <c:minorTickMark val="none"/>
         <c:tickLblPos val="nextTo"/>
         <c:spPr>
           <a:ln>
@@ -447,17 +477,19 @@
             <a:endParaRPr lang="de-DE"/>
           </a:p>
         </c:txPr>
-        <c:crossAx val="90829184"/>
+        <c:crossAx val="302906072"/>
         <c:crosses val="autoZero"/>
         <c:auto val="1"/>
         <c:lblAlgn val="ctr"/>
         <c:lblOffset val="100"/>
+        <c:noMultiLvlLbl val="0"/>
       </c:catAx>
       <c:valAx>
-        <c:axId val="90829184"/>
+        <c:axId val="302906072"/>
         <c:scaling>
           <c:orientation val="minMax"/>
         </c:scaling>
+        <c:delete val="0"/>
         <c:axPos val="l"/>
         <c:majorGridlines>
           <c:spPr>
@@ -470,6 +502,8 @@
           </c:spPr>
         </c:majorGridlines>
         <c:numFmt formatCode="General" sourceLinked="1"/>
+        <c:majorTickMark val="out"/>
+        <c:minorTickMark val="none"/>
         <c:tickLblPos val="nextTo"/>
         <c:spPr>
           <a:ln>
@@ -496,7 +530,7 @@
             <a:endParaRPr lang="de-DE"/>
           </a:p>
         </c:txPr>
-        <c:crossAx val="90806912"/>
+        <c:crossAx val="302905680"/>
         <c:crosses val="autoZero"/>
         <c:crossBetween val="between"/>
         <c:majorUnit val="1"/>
@@ -504,7 +538,7 @@
     </c:plotArea>
     <c:legend>
       <c:legendPos val="r"/>
-      <c:layout/>
+      <c:overlay val="0"/>
       <c:txPr>
         <a:bodyPr/>
         <a:lstStyle/>
@@ -526,6 +560,7 @@
     </c:legend>
     <c:plotVisOnly val="1"/>
     <c:dispBlanksAs val="gap"/>
+    <c:showDLblsOverMax val="0"/>
   </c:chart>
   <c:txPr>
     <a:bodyPr/>
@@ -537,17 +572,28 @@
       <a:endParaRPr lang="de-DE"/>
     </a:p>
   </c:txPr>
-  <c:externalData r:id="rId1"/>
+  <c:externalData r:id="rId1">
+    <c:autoUpdate val="0"/>
+  </c:externalData>
 </c:chartSpace>
 </file>
 
 <file path=ppt/charts/chart2.xml><?xml version="1.0" encoding="utf-8"?>
 <c:chartSpace xmlns:c="http://schemas.openxmlformats.org/drawingml/2006/chart" xmlns:a="http://schemas.openxmlformats.org/drawingml/2006/main" xmlns:r="http://schemas.openxmlformats.org/officeDocument/2006/relationships">
+  <c:date1904 val="0"/>
   <c:lang val="de-DE"/>
-  <c:style val="26"/>
+  <c:roundedCorners val="0"/>
+  <mc:AlternateContent xmlns:mc="http://schemas.openxmlformats.org/markup-compatibility/2006">
+    <mc:Choice xmlns:c14="http://schemas.microsoft.com/office/drawing/2007/8/2/chart" Requires="c14">
+      <c14:style val="126"/>
+    </mc:Choice>
+    <mc:Fallback>
+      <c:style val="26"/>
+    </mc:Fallback>
+  </mc:AlternateContent>
   <c:chart>
     <c:title>
-      <c:layout/>
+      <c:overlay val="0"/>
       <c:txPr>
         <a:bodyPr/>
         <a:lstStyle/>
@@ -559,12 +605,23 @@
         </a:p>
       </c:txPr>
     </c:title>
+    <c:autoTitleDeleted val="0"/>
     <c:view3D>
       <c:rotX val="30"/>
       <c:hPercent val="50"/>
+      <c:rotY val="0"/>
       <c:depthPercent val="100"/>
-      <c:perspective val="30"/>
+      <c:rAngAx val="0"/>
     </c:view3D>
+    <c:floor>
+      <c:thickness val="0"/>
+    </c:floor>
+    <c:sideWall>
+      <c:thickness val="0"/>
+    </c:sideWall>
+    <c:backWall>
+      <c:thickness val="0"/>
+    </c:backWall>
     <c:plotArea>
       <c:layout>
         <c:manualLayout>
@@ -620,7 +677,12 @@
                 <a:endParaRPr lang="de-DE"/>
               </a:p>
             </c:txPr>
+            <c:showLegendKey val="0"/>
+            <c:showVal val="0"/>
+            <c:showCatName val="0"/>
+            <c:showSerName val="0"/>
             <c:showPercent val="1"/>
+            <c:showBubbleSize val="0"/>
             <c:showLeaderLines val="1"/>
             <c:extLst>
               <c:ext xmlns:c15="http://schemas.microsoft.com/office/drawing/2012/chart" uri="{CE6537A1-D6FC-4f65-9D91-7224C49458BB}"/>
@@ -668,7 +730,15 @@
             </c:numRef>
           </c:val>
         </c:ser>
-        <c:dLbls/>
+        <c:dLbls>
+          <c:showLegendKey val="0"/>
+          <c:showVal val="0"/>
+          <c:showCatName val="0"/>
+          <c:showSerName val="0"/>
+          <c:showPercent val="0"/>
+          <c:showBubbleSize val="0"/>
+          <c:showLeaderLines val="1"/>
+        </c:dLbls>
       </c:pie3DChart>
     </c:plotArea>
     <c:legend>
@@ -683,6 +753,7 @@
           <c:h val="0.42146170730846966"/>
         </c:manualLayout>
       </c:layout>
+      <c:overlay val="0"/>
       <c:txPr>
         <a:bodyPr/>
         <a:lstStyle/>
@@ -704,6 +775,7 @@
     </c:legend>
     <c:plotVisOnly val="1"/>
     <c:dispBlanksAs val="zero"/>
+    <c:showDLblsOverMax val="0"/>
   </c:chart>
   <c:txPr>
     <a:bodyPr/>
@@ -715,7 +787,9 @@
       <a:endParaRPr lang="de-DE"/>
     </a:p>
   </c:txPr>
-  <c:externalData r:id="rId1"/>
+  <c:externalData r:id="rId1">
+    <c:autoUpdate val="0"/>
+  </c:externalData>
 </c:chartSpace>
 </file>
 
@@ -1795,6 +1869,13 @@
         </dgm:presLayoutVars>
       </dgm:prSet>
       <dgm:spPr/>
+      <dgm:t>
+        <a:bodyPr/>
+        <a:lstStyle/>
+        <a:p>
+          <a:endParaRPr lang="de-DE"/>
+        </a:p>
+      </dgm:t>
     </dgm:pt>
     <dgm:pt modelId="{79C2CDB1-4F33-459A-BE08-A1A3E742F58F}" type="pres">
       <dgm:prSet presAssocID="{91A85F16-5E07-493E-A387-B7FA6B592146}" presName="vertOne" presStyleCnt="0"/>
@@ -1956,19 +2037,19 @@
     </dgm:pt>
   </dgm:ptLst>
   <dgm:cxnLst>
-    <dgm:cxn modelId="{8AD69EAC-B46B-4FDD-8E2B-302CE3A3911E}" srcId="{42434FFF-09B6-4AF4-B95D-F1FD38E6BDEF}" destId="{91A85F16-5E07-493E-A387-B7FA6B592146}" srcOrd="0" destOrd="0" parTransId="{6726225E-0341-4980-8B8F-2EEDA5C709F3}" sibTransId="{1A42F6FE-8625-43BC-B3CB-1D7922B4D948}"/>
+    <dgm:cxn modelId="{033F5D87-82F0-45B8-9DC6-48AAAFF7849D}" srcId="{91A85F16-5E07-493E-A387-B7FA6B592146}" destId="{78C2197C-62AA-45F6-9ECB-F23BA655EFCB}" srcOrd="2" destOrd="0" parTransId="{1C98607B-A8EA-468A-897F-298483A5AFFA}" sibTransId="{A610E69E-CB76-49B9-AD2C-C801AFEA7E8C}"/>
+    <dgm:cxn modelId="{77F027A1-C739-4CD6-B272-4D217E922906}" type="presOf" srcId="{42434FFF-09B6-4AF4-B95D-F1FD38E6BDEF}" destId="{82BD8961-EFC8-4B04-9C18-666C0006E4E7}" srcOrd="0" destOrd="0" presId="urn:microsoft.com/office/officeart/2005/8/layout/hierarchy4"/>
+    <dgm:cxn modelId="{9CD012C8-91AA-4029-8178-33DD3617FEE7}" type="presOf" srcId="{4FBD60DD-B178-40DF-9BEB-1417EFFBB46C}" destId="{FE343294-F044-47CF-BABF-285852571FB3}" srcOrd="0" destOrd="0" presId="urn:microsoft.com/office/officeart/2005/8/layout/hierarchy4"/>
+    <dgm:cxn modelId="{475D25C1-A672-4911-9ECC-D946BCDB0CFE}" srcId="{91A85F16-5E07-493E-A387-B7FA6B592146}" destId="{E221003B-7BCD-4B6E-B448-DFB764DFE205}" srcOrd="4" destOrd="0" parTransId="{777CFA6E-DC17-4641-B4F1-DAD2DE0047A0}" sibTransId="{FF800003-597F-4C17-B434-CD77B6E5504F}"/>
+    <dgm:cxn modelId="{44191267-DCEB-47C4-963B-4272847CD001}" type="presOf" srcId="{E221003B-7BCD-4B6E-B448-DFB764DFE205}" destId="{8978EF0D-6E73-4312-B512-C07F7D6F590D}" srcOrd="0" destOrd="0" presId="urn:microsoft.com/office/officeart/2005/8/layout/hierarchy4"/>
     <dgm:cxn modelId="{7E6DC4D2-27B7-4A88-9184-B8851C817B41}" srcId="{91A85F16-5E07-493E-A387-B7FA6B592146}" destId="{CC7F6CCA-F35F-46A3-9F83-AC7FEFB24D5B}" srcOrd="0" destOrd="0" parTransId="{652FF422-66C0-456D-8985-6B86A63DDFE1}" sibTransId="{E478B1DB-F74D-48E0-9C4A-E782099C56B0}"/>
-    <dgm:cxn modelId="{475D25C1-A672-4911-9ECC-D946BCDB0CFE}" srcId="{91A85F16-5E07-493E-A387-B7FA6B592146}" destId="{E221003B-7BCD-4B6E-B448-DFB764DFE205}" srcOrd="4" destOrd="0" parTransId="{777CFA6E-DC17-4641-B4F1-DAD2DE0047A0}" sibTransId="{FF800003-597F-4C17-B434-CD77B6E5504F}"/>
+    <dgm:cxn modelId="{A0B1954B-7A00-403F-814F-06381C4451C3}" srcId="{91A85F16-5E07-493E-A387-B7FA6B592146}" destId="{15B51F5D-36E0-4181-AA5F-212AFA53FC38}" srcOrd="3" destOrd="0" parTransId="{7A0B0457-EEFB-41B4-851C-10DCC265E58D}" sibTransId="{0CFD2416-6D01-4571-8118-6E43E3EBBBFF}"/>
     <dgm:cxn modelId="{8EB34A7C-5431-460D-B190-B4C58D4592D0}" type="presOf" srcId="{15B51F5D-36E0-4181-AA5F-212AFA53FC38}" destId="{7A01EBD5-9E50-49A4-8DAC-20B85A7668F5}" srcOrd="0" destOrd="0" presId="urn:microsoft.com/office/officeart/2005/8/layout/hierarchy4"/>
     <dgm:cxn modelId="{A2C42033-BDF1-4F30-BE91-6B1974CD9C9B}" type="presOf" srcId="{78C2197C-62AA-45F6-9ECB-F23BA655EFCB}" destId="{626DBD90-D47A-4AF6-A56A-6A11A2533899}" srcOrd="0" destOrd="0" presId="urn:microsoft.com/office/officeart/2005/8/layout/hierarchy4"/>
+    <dgm:cxn modelId="{8AD69EAC-B46B-4FDD-8E2B-302CE3A3911E}" srcId="{42434FFF-09B6-4AF4-B95D-F1FD38E6BDEF}" destId="{91A85F16-5E07-493E-A387-B7FA6B592146}" srcOrd="0" destOrd="0" parTransId="{6726225E-0341-4980-8B8F-2EEDA5C709F3}" sibTransId="{1A42F6FE-8625-43BC-B3CB-1D7922B4D948}"/>
+    <dgm:cxn modelId="{9108667B-5172-45C5-98DE-8CCFA0492082}" srcId="{91A85F16-5E07-493E-A387-B7FA6B592146}" destId="{4FBD60DD-B178-40DF-9BEB-1417EFFBB46C}" srcOrd="1" destOrd="0" parTransId="{944A50E6-632F-422D-A1A6-45F91997E31A}" sibTransId="{CD9625B5-F386-44E8-97EF-31921E44CDFD}"/>
     <dgm:cxn modelId="{A50D03EE-6EF4-49C2-83D8-6732D9418D73}" type="presOf" srcId="{91A85F16-5E07-493E-A387-B7FA6B592146}" destId="{5C9AFDC9-63CF-44D3-A7C2-223CA1565391}" srcOrd="0" destOrd="0" presId="urn:microsoft.com/office/officeart/2005/8/layout/hierarchy4"/>
-    <dgm:cxn modelId="{9108667B-5172-45C5-98DE-8CCFA0492082}" srcId="{91A85F16-5E07-493E-A387-B7FA6B592146}" destId="{4FBD60DD-B178-40DF-9BEB-1417EFFBB46C}" srcOrd="1" destOrd="0" parTransId="{944A50E6-632F-422D-A1A6-45F91997E31A}" sibTransId="{CD9625B5-F386-44E8-97EF-31921E44CDFD}"/>
     <dgm:cxn modelId="{DAFAB343-62E3-475F-B96C-56F34351E3D4}" type="presOf" srcId="{CC7F6CCA-F35F-46A3-9F83-AC7FEFB24D5B}" destId="{78D29DC7-FB7A-4C16-B791-9E0CA401820C}" srcOrd="0" destOrd="0" presId="urn:microsoft.com/office/officeart/2005/8/layout/hierarchy4"/>
-    <dgm:cxn modelId="{9CD012C8-91AA-4029-8178-33DD3617FEE7}" type="presOf" srcId="{4FBD60DD-B178-40DF-9BEB-1417EFFBB46C}" destId="{FE343294-F044-47CF-BABF-285852571FB3}" srcOrd="0" destOrd="0" presId="urn:microsoft.com/office/officeart/2005/8/layout/hierarchy4"/>
-    <dgm:cxn modelId="{033F5D87-82F0-45B8-9DC6-48AAAFF7849D}" srcId="{91A85F16-5E07-493E-A387-B7FA6B592146}" destId="{78C2197C-62AA-45F6-9ECB-F23BA655EFCB}" srcOrd="2" destOrd="0" parTransId="{1C98607B-A8EA-468A-897F-298483A5AFFA}" sibTransId="{A610E69E-CB76-49B9-AD2C-C801AFEA7E8C}"/>
-    <dgm:cxn modelId="{44191267-DCEB-47C4-963B-4272847CD001}" type="presOf" srcId="{E221003B-7BCD-4B6E-B448-DFB764DFE205}" destId="{8978EF0D-6E73-4312-B512-C07F7D6F590D}" srcOrd="0" destOrd="0" presId="urn:microsoft.com/office/officeart/2005/8/layout/hierarchy4"/>
-    <dgm:cxn modelId="{A0B1954B-7A00-403F-814F-06381C4451C3}" srcId="{91A85F16-5E07-493E-A387-B7FA6B592146}" destId="{15B51F5D-36E0-4181-AA5F-212AFA53FC38}" srcOrd="3" destOrd="0" parTransId="{7A0B0457-EEFB-41B4-851C-10DCC265E58D}" sibTransId="{0CFD2416-6D01-4571-8118-6E43E3EBBBFF}"/>
-    <dgm:cxn modelId="{77F027A1-C739-4CD6-B272-4D217E922906}" type="presOf" srcId="{42434FFF-09B6-4AF4-B95D-F1FD38E6BDEF}" destId="{82BD8961-EFC8-4B04-9C18-666C0006E4E7}" srcOrd="0" destOrd="0" presId="urn:microsoft.com/office/officeart/2005/8/layout/hierarchy4"/>
     <dgm:cxn modelId="{A2FD2697-1D00-4DC1-90F7-B1577A2BFD84}" type="presParOf" srcId="{82BD8961-EFC8-4B04-9C18-666C0006E4E7}" destId="{79C2CDB1-4F33-459A-BE08-A1A3E742F58F}" srcOrd="0" destOrd="0" presId="urn:microsoft.com/office/officeart/2005/8/layout/hierarchy4"/>
     <dgm:cxn modelId="{F447E14F-1CB2-49E8-AA39-3FCE76974213}" type="presParOf" srcId="{79C2CDB1-4F33-459A-BE08-A1A3E742F58F}" destId="{5C9AFDC9-63CF-44D3-A7C2-223CA1565391}" srcOrd="0" destOrd="0" presId="urn:microsoft.com/office/officeart/2005/8/layout/hierarchy4"/>
     <dgm:cxn modelId="{67992D5A-9954-4DAF-ADA7-5FE5877A732D}" type="presParOf" srcId="{79C2CDB1-4F33-459A-BE08-A1A3E742F58F}" destId="{5D8832EE-F85B-453F-889E-9C141929D9E4}" srcOrd="1" destOrd="0" presId="urn:microsoft.com/office/officeart/2005/8/layout/hierarchy4"/>
@@ -1997,14 +2078,14 @@
   <dgm:whole/>
   <dgm:extLst>
     <a:ext uri="http://schemas.microsoft.com/office/drawing/2008/diagram">
-      <dsp:dataModelExt xmlns:dsp="http://schemas.microsoft.com/office/drawing/2008/diagram" xmlns="" relId="rId7" minVer="http://schemas.openxmlformats.org/drawingml/2006/diagram"/>
+      <dsp:dataModelExt xmlns:dsp="http://schemas.microsoft.com/office/drawing/2008/diagram" relId="rId7" minVer="http://schemas.openxmlformats.org/drawingml/2006/diagram"/>
     </a:ext>
   </dgm:extLst>
 </dgm:dataModel>
 </file>
 
 <file path=ppt/diagrams/drawing1.xml><?xml version="1.0" encoding="utf-8"?>
-<dsp:drawing xmlns:dgm="http://schemas.openxmlformats.org/drawingml/2006/diagram" xmlns:a="http://schemas.openxmlformats.org/drawingml/2006/main" xmlns:dsp="http://schemas.microsoft.com/office/drawing/2008/diagram">
+<dsp:drawing xmlns:dgm="http://schemas.openxmlformats.org/drawingml/2006/diagram" xmlns:dsp="http://schemas.microsoft.com/office/drawing/2008/diagram" xmlns:a="http://schemas.openxmlformats.org/drawingml/2006/main">
   <dsp:spTree>
     <dsp:nvGrpSpPr>
       <dsp:cNvPr id="0" name=""/>
@@ -2086,8 +2167,8 @@
         </a:p>
       </dsp:txBody>
       <dsp:txXfrm>
-        <a:off x="2446" y="1500"/>
-        <a:ext cx="6091106" cy="1948656"/>
+        <a:off x="59520" y="58574"/>
+        <a:ext cx="5976958" cy="1834508"/>
       </dsp:txXfrm>
     </dsp:sp>
     <dsp:sp modelId="{78D29DC7-FB7A-4C16-B791-9E0CA401820C}">
@@ -2159,8 +2240,8 @@
         </a:p>
       </dsp:txBody>
       <dsp:txXfrm>
-        <a:off x="2446" y="2113843"/>
-        <a:ext cx="1141511" cy="1948656"/>
+        <a:off x="35880" y="2147277"/>
+        <a:ext cx="1074643" cy="1881788"/>
       </dsp:txXfrm>
     </dsp:sp>
     <dsp:sp modelId="{FE343294-F044-47CF-BABF-285852571FB3}">
@@ -2232,8 +2313,8 @@
         </a:p>
       </dsp:txBody>
       <dsp:txXfrm>
-        <a:off x="1239845" y="2113843"/>
-        <a:ext cx="1141511" cy="1948656"/>
+        <a:off x="1273279" y="2147277"/>
+        <a:ext cx="1074643" cy="1881788"/>
       </dsp:txXfrm>
     </dsp:sp>
     <dsp:sp modelId="{626DBD90-D47A-4AF6-A56A-6A11A2533899}">
@@ -2304,8 +2385,8 @@
         </a:p>
       </dsp:txBody>
       <dsp:txXfrm>
-        <a:off x="2477244" y="2113843"/>
-        <a:ext cx="1141511" cy="1948656"/>
+        <a:off x="2510678" y="2147277"/>
+        <a:ext cx="1074643" cy="1881788"/>
       </dsp:txXfrm>
     </dsp:sp>
     <dsp:sp modelId="{7A01EBD5-9E50-49A4-8DAC-20B85A7668F5}">
@@ -2376,8 +2457,8 @@
         </a:p>
       </dsp:txBody>
       <dsp:txXfrm>
-        <a:off x="3714642" y="2113843"/>
-        <a:ext cx="1141511" cy="1948656"/>
+        <a:off x="3748076" y="2147277"/>
+        <a:ext cx="1074643" cy="1881788"/>
       </dsp:txXfrm>
     </dsp:sp>
     <dsp:sp modelId="{8978EF0D-6E73-4312-B512-C07F7D6F590D}">
@@ -2448,8 +2529,8 @@
         </a:p>
       </dsp:txBody>
       <dsp:txXfrm>
-        <a:off x="4952041" y="2113843"/>
-        <a:ext cx="1141511" cy="1948656"/>
+        <a:off x="4985475" y="2147277"/>
+        <a:ext cx="1074643" cy="1881788"/>
       </dsp:txXfrm>
     </dsp:sp>
   </dsp:spTree>
@@ -4095,7 +4176,7 @@
             <a:fld id="{5AB3429A-4996-4E8A-9907-26EBCB65C05D}" type="datetimeFigureOut">
               <a:rPr lang="en-US" smtClean="0"/>
               <a:pPr/>
-              <a:t>1/25/2015</a:t>
+              <a:t>1/26/2015</a:t>
             </a:fld>
             <a:endParaRPr lang="en-US"/>
           </a:p>
@@ -4266,7 +4347,7 @@
     </p:spTree>
     <p:extLst>
       <p:ext uri="{BB962C8B-B14F-4D97-AF65-F5344CB8AC3E}">
-        <p14:creationId xmlns:p14="http://schemas.microsoft.com/office/powerpoint/2010/main" xmlns="" val="685702559"/>
+        <p14:creationId xmlns:p14="http://schemas.microsoft.com/office/powerpoint/2010/main" val="685702559"/>
       </p:ext>
     </p:extLst>
   </p:cSld>
@@ -4462,7 +4543,7 @@
               <a:pPr algn="r" defTabSz="914400">
                 <a:buNone/>
               </a:pPr>
-              <a:t>1/25/2015 4:08 PM</a:t>
+              <a:t>1/26/2015 7:45 PM</a:t>
             </a:fld>
             <a:endParaRPr lang="en-US" sz="1200" b="0" i="0">
               <a:latin typeface="Calibri"/>
@@ -4597,7 +4678,7 @@
     </p:spTree>
     <p:extLst>
       <p:ext uri="{BB962C8B-B14F-4D97-AF65-F5344CB8AC3E}">
-        <p14:creationId xmlns:p14="http://schemas.microsoft.com/office/powerpoint/2010/main" xmlns="" val="3303831938"/>
+        <p14:creationId xmlns:p14="http://schemas.microsoft.com/office/powerpoint/2010/main" val="3303831938"/>
       </p:ext>
     </p:extLst>
   </p:cSld>
@@ -4722,6 +4803,11 @@
         </p:txBody>
       </p:sp>
     </p:spTree>
+    <p:extLst>
+      <p:ext uri="{BB962C8B-B14F-4D97-AF65-F5344CB8AC3E}">
+        <p14:creationId xmlns:p14="http://schemas.microsoft.com/office/powerpoint/2010/main" val="3143107461"/>
+      </p:ext>
+    </p:extLst>
   </p:cSld>
   <p:clrMapOvr>
     <a:masterClrMapping/>
@@ -4844,6 +4930,11 @@
         </p:txBody>
       </p:sp>
     </p:spTree>
+    <p:extLst>
+      <p:ext uri="{BB962C8B-B14F-4D97-AF65-F5344CB8AC3E}">
+        <p14:creationId xmlns:p14="http://schemas.microsoft.com/office/powerpoint/2010/main" val="3340160494"/>
+      </p:ext>
+    </p:extLst>
   </p:cSld>
   <p:clrMapOvr>
     <a:masterClrMapping/>
@@ -4966,6 +5057,11 @@
         </p:txBody>
       </p:sp>
     </p:spTree>
+    <p:extLst>
+      <p:ext uri="{BB962C8B-B14F-4D97-AF65-F5344CB8AC3E}">
+        <p14:creationId xmlns:p14="http://schemas.microsoft.com/office/powerpoint/2010/main" val="3414368743"/>
+      </p:ext>
+    </p:extLst>
   </p:cSld>
   <p:clrMapOvr>
     <a:masterClrMapping/>
@@ -5069,7 +5165,7 @@
               <a:pPr algn="r" defTabSz="914400">
                 <a:buNone/>
               </a:pPr>
-              <a:t>1/25/2015 4:08 PM</a:t>
+              <a:t>1/26/2015 7:46 PM</a:t>
             </a:fld>
             <a:endParaRPr lang="en-US" sz="1200" b="0" i="0">
               <a:latin typeface="Calibri"/>
@@ -5194,7 +5290,7 @@
     </p:spTree>
     <p:extLst>
       <p:ext uri="{BB962C8B-B14F-4D97-AF65-F5344CB8AC3E}">
-        <p14:creationId xmlns:p14="http://schemas.microsoft.com/office/powerpoint/2010/main" xmlns="" val="3414635844"/>
+        <p14:creationId xmlns:p14="http://schemas.microsoft.com/office/powerpoint/2010/main" val="3414635844"/>
       </p:ext>
     </p:extLst>
   </p:cSld>
@@ -5300,7 +5396,7 @@
               <a:pPr algn="r" defTabSz="914400">
                 <a:buNone/>
               </a:pPr>
-              <a:t>1/25/2015 4:08 PM</a:t>
+              <a:t>1/26/2015 7:46 PM</a:t>
             </a:fld>
             <a:endParaRPr lang="en-US" sz="1200" b="0" i="0">
               <a:latin typeface="Calibri"/>
@@ -5425,7 +5521,7 @@
     </p:spTree>
     <p:extLst>
       <p:ext uri="{BB962C8B-B14F-4D97-AF65-F5344CB8AC3E}">
-        <p14:creationId xmlns:p14="http://schemas.microsoft.com/office/powerpoint/2010/main" xmlns="" val="3009110784"/>
+        <p14:creationId xmlns:p14="http://schemas.microsoft.com/office/powerpoint/2010/main" val="3009110784"/>
       </p:ext>
     </p:extLst>
   </p:cSld>
@@ -5525,7 +5621,7 @@
     </p:spTree>
     <p:extLst>
       <p:ext uri="{BB962C8B-B14F-4D97-AF65-F5344CB8AC3E}">
-        <p14:creationId xmlns:p14="http://schemas.microsoft.com/office/powerpoint/2010/main" xmlns="" val="4134735546"/>
+        <p14:creationId xmlns:p14="http://schemas.microsoft.com/office/powerpoint/2010/main" val="4134735546"/>
       </p:ext>
     </p:extLst>
   </p:cSld>
@@ -5631,7 +5727,7 @@
               <a:pPr algn="r" defTabSz="914400">
                 <a:buNone/>
               </a:pPr>
-              <a:t>1/25/2015 4:08 PM</a:t>
+              <a:t>1/26/2015 7:46 PM</a:t>
             </a:fld>
             <a:endParaRPr lang="en-US" sz="1200" b="0" i="0">
               <a:latin typeface="Calibri"/>
@@ -5756,7 +5852,7 @@
     </p:spTree>
     <p:extLst>
       <p:ext uri="{BB962C8B-B14F-4D97-AF65-F5344CB8AC3E}">
-        <p14:creationId xmlns:p14="http://schemas.microsoft.com/office/powerpoint/2010/main" xmlns="" val="526236491"/>
+        <p14:creationId xmlns:p14="http://schemas.microsoft.com/office/powerpoint/2010/main" val="526236491"/>
       </p:ext>
     </p:extLst>
   </p:cSld>
@@ -5881,6 +5977,11 @@
         </p:txBody>
       </p:sp>
     </p:spTree>
+    <p:extLst>
+      <p:ext uri="{BB962C8B-B14F-4D97-AF65-F5344CB8AC3E}">
+        <p14:creationId xmlns:p14="http://schemas.microsoft.com/office/powerpoint/2010/main" val="3541088177"/>
+      </p:ext>
+    </p:extLst>
   </p:cSld>
   <p:clrMapOvr>
     <a:masterClrMapping/>
@@ -6003,6 +6104,11 @@
         </p:txBody>
       </p:sp>
     </p:spTree>
+    <p:extLst>
+      <p:ext uri="{BB962C8B-B14F-4D97-AF65-F5344CB8AC3E}">
+        <p14:creationId xmlns:p14="http://schemas.microsoft.com/office/powerpoint/2010/main" val="1688314071"/>
+      </p:ext>
+    </p:extLst>
   </p:cSld>
   <p:clrMapOvr>
     <a:masterClrMapping/>
@@ -6125,6 +6231,11 @@
         </p:txBody>
       </p:sp>
     </p:spTree>
+    <p:extLst>
+      <p:ext uri="{BB962C8B-B14F-4D97-AF65-F5344CB8AC3E}">
+        <p14:creationId xmlns:p14="http://schemas.microsoft.com/office/powerpoint/2010/main" val="3850646948"/>
+      </p:ext>
+    </p:extLst>
   </p:cSld>
   <p:clrMapOvr>
     <a:masterClrMapping/>
@@ -6247,6 +6358,11 @@
         </p:txBody>
       </p:sp>
     </p:spTree>
+    <p:extLst>
+      <p:ext uri="{BB962C8B-B14F-4D97-AF65-F5344CB8AC3E}">
+        <p14:creationId xmlns:p14="http://schemas.microsoft.com/office/powerpoint/2010/main" val="2719430136"/>
+      </p:ext>
+    </p:extLst>
   </p:cSld>
   <p:clrMapOvr>
     <a:masterClrMapping/>
@@ -6369,6 +6485,11 @@
         </p:txBody>
       </p:sp>
     </p:spTree>
+    <p:extLst>
+      <p:ext uri="{BB962C8B-B14F-4D97-AF65-F5344CB8AC3E}">
+        <p14:creationId xmlns:p14="http://schemas.microsoft.com/office/powerpoint/2010/main" val="974127883"/>
+      </p:ext>
+    </p:extLst>
   </p:cSld>
   <p:clrMapOvr>
     <a:masterClrMapping/>
@@ -6491,6 +6612,11 @@
         </p:txBody>
       </p:sp>
     </p:spTree>
+    <p:extLst>
+      <p:ext uri="{BB962C8B-B14F-4D97-AF65-F5344CB8AC3E}">
+        <p14:creationId xmlns:p14="http://schemas.microsoft.com/office/powerpoint/2010/main" val="1184623129"/>
+      </p:ext>
+    </p:extLst>
   </p:cSld>
   <p:clrMapOvr>
     <a:masterClrMapping/>
@@ -6613,6 +6739,11 @@
         </p:txBody>
       </p:sp>
     </p:spTree>
+    <p:extLst>
+      <p:ext uri="{BB962C8B-B14F-4D97-AF65-F5344CB8AC3E}">
+        <p14:creationId xmlns:p14="http://schemas.microsoft.com/office/powerpoint/2010/main" val="142071806"/>
+      </p:ext>
+    </p:extLst>
   </p:cSld>
   <p:clrMapOvr>
     <a:masterClrMapping/>
@@ -6735,6 +6866,11 @@
         </p:txBody>
       </p:sp>
     </p:spTree>
+    <p:extLst>
+      <p:ext uri="{BB962C8B-B14F-4D97-AF65-F5344CB8AC3E}">
+        <p14:creationId xmlns:p14="http://schemas.microsoft.com/office/powerpoint/2010/main" val="3476775119"/>
+      </p:ext>
+    </p:extLst>
   </p:cSld>
   <p:clrMapOvr>
     <a:masterClrMapping/>
@@ -10567,7 +10703,6 @@
               <a:rPr lang="de-DE" dirty="0" smtClean="0"/>
               <a:t>Vorbereitung der Präsentation bis zum 30.01.2015</a:t>
             </a:r>
-            <a:endParaRPr lang="de-DE" dirty="0" smtClean="0"/>
           </a:p>
           <a:p>
             <a:r>
@@ -10578,7 +10713,6 @@
               <a:rPr lang="de-DE" b="1" dirty="0" smtClean="0"/>
               <a:t>30.01.2015</a:t>
             </a:r>
-            <a:endParaRPr lang="de-DE" b="1" dirty="0" smtClean="0"/>
           </a:p>
         </p:txBody>
       </p:sp>
@@ -10655,7 +10789,7 @@
     </p:spTree>
     <p:extLst>
       <p:ext uri="{BB962C8B-B14F-4D97-AF65-F5344CB8AC3E}">
-        <p14:creationId xmlns:p14="http://schemas.microsoft.com/office/powerpoint/2010/main" xmlns="" val="2261671502"/>
+        <p14:creationId xmlns:p14="http://schemas.microsoft.com/office/powerpoint/2010/main" val="2261671502"/>
       </p:ext>
     </p:extLst>
   </p:cSld>
@@ -10951,7 +11085,7 @@
     </p:spTree>
     <p:extLst>
       <p:ext uri="{BB962C8B-B14F-4D97-AF65-F5344CB8AC3E}">
-        <p14:creationId xmlns:p14="http://schemas.microsoft.com/office/powerpoint/2010/main" xmlns="" val="2261671502"/>
+        <p14:creationId xmlns:p14="http://schemas.microsoft.com/office/powerpoint/2010/main" val="2261671502"/>
       </p:ext>
     </p:extLst>
   </p:cSld>
@@ -11012,10 +11146,6 @@
               <a:rPr lang="de-DE" dirty="0" smtClean="0"/>
               <a:t>Aufgabenverteilung</a:t>
             </a:r>
-            <a:r>
-              <a:rPr lang="de-DE" dirty="0" smtClean="0"/>
-              <a:t/>
-            </a:r>
             <a:br>
               <a:rPr lang="de-DE" dirty="0" smtClean="0"/>
             </a:br>
@@ -11112,7 +11242,7 @@
     </p:spTree>
     <p:extLst>
       <p:ext uri="{BB962C8B-B14F-4D97-AF65-F5344CB8AC3E}">
-        <p14:creationId xmlns:p14="http://schemas.microsoft.com/office/powerpoint/2010/main" xmlns="" val="2261671502"/>
+        <p14:creationId xmlns:p14="http://schemas.microsoft.com/office/powerpoint/2010/main" val="2261671502"/>
       </p:ext>
     </p:extLst>
   </p:cSld>
@@ -11388,7 +11518,7 @@
     </p:spTree>
     <p:extLst>
       <p:ext uri="{BB962C8B-B14F-4D97-AF65-F5344CB8AC3E}">
-        <p14:creationId xmlns:p14="http://schemas.microsoft.com/office/powerpoint/2010/main" xmlns="" val="2261671502"/>
+        <p14:creationId xmlns:p14="http://schemas.microsoft.com/office/powerpoint/2010/main" val="2261671502"/>
       </p:ext>
     </p:extLst>
   </p:cSld>
@@ -11670,7 +11800,7 @@
     </p:spTree>
     <p:extLst>
       <p:ext uri="{BB962C8B-B14F-4D97-AF65-F5344CB8AC3E}">
-        <p14:creationId xmlns:p14="http://schemas.microsoft.com/office/powerpoint/2010/main" xmlns="" val="2261671502"/>
+        <p14:creationId xmlns:p14="http://schemas.microsoft.com/office/powerpoint/2010/main" val="2261671502"/>
       </p:ext>
     </p:extLst>
   </p:cSld>
@@ -11865,11 +11995,7 @@
             </a:pPr>
             <a:r>
               <a:rPr lang="de-DE" dirty="0" smtClean="0"/>
-              <a:t> </a:t>
-            </a:r>
-            <a:r>
-              <a:rPr lang="de-DE" dirty="0" smtClean="0"/>
-              <a:t>Beispieltexte erweitert</a:t>
+              <a:t> Beispieltexte erweitert</a:t>
             </a:r>
           </a:p>
           <a:p>
@@ -11957,7 +12083,7 @@
     </p:spTree>
     <p:extLst>
       <p:ext uri="{BB962C8B-B14F-4D97-AF65-F5344CB8AC3E}">
-        <p14:creationId xmlns:p14="http://schemas.microsoft.com/office/powerpoint/2010/main" xmlns="" val="2261671502"/>
+        <p14:creationId xmlns:p14="http://schemas.microsoft.com/office/powerpoint/2010/main" val="2261671502"/>
       </p:ext>
     </p:extLst>
   </p:cSld>
@@ -12292,7 +12418,7 @@
     </p:spTree>
     <p:extLst>
       <p:ext uri="{BB962C8B-B14F-4D97-AF65-F5344CB8AC3E}">
-        <p14:creationId xmlns:p14="http://schemas.microsoft.com/office/powerpoint/2010/main" xmlns="" val="2261671502"/>
+        <p14:creationId xmlns:p14="http://schemas.microsoft.com/office/powerpoint/2010/main" val="2261671502"/>
       </p:ext>
     </p:extLst>
   </p:cSld>
@@ -12534,7 +12660,7 @@
     </p:spTree>
     <p:extLst>
       <p:ext uri="{BB962C8B-B14F-4D97-AF65-F5344CB8AC3E}">
-        <p14:creationId xmlns:p14="http://schemas.microsoft.com/office/powerpoint/2010/main" xmlns="" val="2261671502"/>
+        <p14:creationId xmlns:p14="http://schemas.microsoft.com/office/powerpoint/2010/main" val="2261671502"/>
       </p:ext>
     </p:extLst>
   </p:cSld>
@@ -12805,11 +12931,7 @@
             </a:pPr>
             <a:r>
               <a:rPr lang="de-DE" dirty="0" smtClean="0"/>
-              <a:t> </a:t>
-            </a:r>
-            <a:r>
-              <a:rPr lang="de-DE" dirty="0" smtClean="0"/>
-              <a:t>Design aufarbeiten</a:t>
+              <a:t> Design aufarbeiten</a:t>
             </a:r>
           </a:p>
           <a:p>
@@ -12819,11 +12941,7 @@
             </a:pPr>
             <a:r>
               <a:rPr lang="de-DE" dirty="0" smtClean="0"/>
-              <a:t> </a:t>
-            </a:r>
-            <a:r>
-              <a:rPr lang="de-DE" dirty="0" smtClean="0"/>
-              <a:t>Demo-Daten erstellen</a:t>
+              <a:t> Demo-Daten erstellen</a:t>
             </a:r>
           </a:p>
         </p:txBody>
@@ -12831,7 +12949,7 @@
     </p:spTree>
     <p:extLst>
       <p:ext uri="{BB962C8B-B14F-4D97-AF65-F5344CB8AC3E}">
-        <p14:creationId xmlns:p14="http://schemas.microsoft.com/office/powerpoint/2010/main" xmlns="" val="2261671502"/>
+        <p14:creationId xmlns:p14="http://schemas.microsoft.com/office/powerpoint/2010/main" val="2261671502"/>
       </p:ext>
     </p:extLst>
   </p:cSld>
@@ -13108,7 +13226,7 @@
     </p:spTree>
     <p:extLst>
       <p:ext uri="{BB962C8B-B14F-4D97-AF65-F5344CB8AC3E}">
-        <p14:creationId xmlns:p14="http://schemas.microsoft.com/office/powerpoint/2010/main" xmlns="" val="2261671502"/>
+        <p14:creationId xmlns:p14="http://schemas.microsoft.com/office/powerpoint/2010/main" val="2261671502"/>
       </p:ext>
     </p:extLst>
   </p:cSld>
@@ -13391,7 +13509,7 @@
     </p:spTree>
     <p:extLst>
       <p:ext uri="{BB962C8B-B14F-4D97-AF65-F5344CB8AC3E}">
-        <p14:creationId xmlns:p14="http://schemas.microsoft.com/office/powerpoint/2010/main" xmlns="" val="176972638"/>
+        <p14:creationId xmlns:p14="http://schemas.microsoft.com/office/powerpoint/2010/main" val="176972638"/>
       </p:ext>
     </p:extLst>
   </p:cSld>
@@ -13665,7 +13783,7 @@
     </p:spTree>
     <p:extLst>
       <p:ext uri="{BB962C8B-B14F-4D97-AF65-F5344CB8AC3E}">
-        <p14:creationId xmlns:p14="http://schemas.microsoft.com/office/powerpoint/2010/main" xmlns="" val="2261671502"/>
+        <p14:creationId xmlns:p14="http://schemas.microsoft.com/office/powerpoint/2010/main" val="2261671502"/>
       </p:ext>
     </p:extLst>
   </p:cSld>
@@ -13903,7 +14021,7 @@
     </p:spTree>
     <p:extLst>
       <p:ext uri="{BB962C8B-B14F-4D97-AF65-F5344CB8AC3E}">
-        <p14:creationId xmlns:p14="http://schemas.microsoft.com/office/powerpoint/2010/main" xmlns="" val="2261671502"/>
+        <p14:creationId xmlns:p14="http://schemas.microsoft.com/office/powerpoint/2010/main" val="2261671502"/>
       </p:ext>
     </p:extLst>
   </p:cSld>
@@ -14143,7 +14261,7 @@
     </p:spTree>
     <p:extLst>
       <p:ext uri="{BB962C8B-B14F-4D97-AF65-F5344CB8AC3E}">
-        <p14:creationId xmlns:p14="http://schemas.microsoft.com/office/powerpoint/2010/main" xmlns="" val="707580364"/>
+        <p14:creationId xmlns:p14="http://schemas.microsoft.com/office/powerpoint/2010/main" val="707580364"/>
       </p:ext>
     </p:extLst>
   </p:cSld>
@@ -14309,7 +14427,7 @@
     </p:spTree>
     <p:extLst>
       <p:ext uri="{BB962C8B-B14F-4D97-AF65-F5344CB8AC3E}">
-        <p14:creationId xmlns:p14="http://schemas.microsoft.com/office/powerpoint/2010/main" xmlns="" val="1320074621"/>
+        <p14:creationId xmlns:p14="http://schemas.microsoft.com/office/powerpoint/2010/main" val="1320074621"/>
       </p:ext>
     </p:extLst>
   </p:cSld>
@@ -14549,7 +14667,7 @@
     </p:spTree>
     <p:extLst>
       <p:ext uri="{BB962C8B-B14F-4D97-AF65-F5344CB8AC3E}">
-        <p14:creationId xmlns:p14="http://schemas.microsoft.com/office/powerpoint/2010/main" xmlns="" val="1031461879"/>
+        <p14:creationId xmlns:p14="http://schemas.microsoft.com/office/powerpoint/2010/main" val="1031461879"/>
       </p:ext>
     </p:extLst>
   </p:cSld>
@@ -14714,7 +14832,7 @@
     </p:spTree>
     <p:extLst>
       <p:ext uri="{BB962C8B-B14F-4D97-AF65-F5344CB8AC3E}">
-        <p14:creationId xmlns:p14="http://schemas.microsoft.com/office/powerpoint/2010/main" xmlns="" val="1798433020"/>
+        <p14:creationId xmlns:p14="http://schemas.microsoft.com/office/powerpoint/2010/main" val="1798433020"/>
       </p:ext>
     </p:extLst>
   </p:cSld>
@@ -15179,7 +15297,7 @@
     </p:spTree>
     <p:extLst>
       <p:ext uri="{BB962C8B-B14F-4D97-AF65-F5344CB8AC3E}">
-        <p14:creationId xmlns:p14="http://schemas.microsoft.com/office/powerpoint/2010/main" xmlns="" val="5548756"/>
+        <p14:creationId xmlns:p14="http://schemas.microsoft.com/office/powerpoint/2010/main" val="5548756"/>
       </p:ext>
     </p:extLst>
   </p:cSld>
@@ -15344,7 +15462,7 @@
     </p:spTree>
     <p:extLst>
       <p:ext uri="{BB962C8B-B14F-4D97-AF65-F5344CB8AC3E}">
-        <p14:creationId xmlns:p14="http://schemas.microsoft.com/office/powerpoint/2010/main" xmlns="" val="1925820115"/>
+        <p14:creationId xmlns:p14="http://schemas.microsoft.com/office/powerpoint/2010/main" val="1925820115"/>
       </p:ext>
     </p:extLst>
   </p:cSld>
@@ -15577,7 +15695,7 @@
     </p:spTree>
     <p:extLst>
       <p:ext uri="{BB962C8B-B14F-4D97-AF65-F5344CB8AC3E}">
-        <p14:creationId xmlns:p14="http://schemas.microsoft.com/office/powerpoint/2010/main" xmlns="" val="1749249379"/>
+        <p14:creationId xmlns:p14="http://schemas.microsoft.com/office/powerpoint/2010/main" val="1749249379"/>
       </p:ext>
     </p:extLst>
   </p:cSld>
@@ -15810,7 +15928,7 @@
     </p:spTree>
     <p:extLst>
       <p:ext uri="{BB962C8B-B14F-4D97-AF65-F5344CB8AC3E}">
-        <p14:creationId xmlns:p14="http://schemas.microsoft.com/office/powerpoint/2010/main" xmlns="" val="1027063275"/>
+        <p14:creationId xmlns:p14="http://schemas.microsoft.com/office/powerpoint/2010/main" val="1027063275"/>
       </p:ext>
     </p:extLst>
   </p:cSld>
@@ -15975,7 +16093,7 @@
     </p:spTree>
     <p:extLst>
       <p:ext uri="{BB962C8B-B14F-4D97-AF65-F5344CB8AC3E}">
-        <p14:creationId xmlns:p14="http://schemas.microsoft.com/office/powerpoint/2010/main" xmlns="" val="2479122477"/>
+        <p14:creationId xmlns:p14="http://schemas.microsoft.com/office/powerpoint/2010/main" val="2479122477"/>
       </p:ext>
     </p:extLst>
   </p:cSld>
@@ -16353,7 +16471,7 @@
           <p:nvPr>
             <p:extLst>
               <p:ext uri="{D42A27DB-BD31-4B8C-83A1-F6EECF244321}">
-                <p14:modId xmlns:p14="http://schemas.microsoft.com/office/powerpoint/2010/main" xmlns="" val="3362911810"/>
+                <p14:modId xmlns:p14="http://schemas.microsoft.com/office/powerpoint/2010/main" val="3362911810"/>
               </p:ext>
             </p:extLst>
           </p:nvPr>
@@ -16464,7 +16582,7 @@
           <p:nvPr>
             <p:extLst>
               <p:ext uri="{D42A27DB-BD31-4B8C-83A1-F6EECF244321}">
-                <p14:modId xmlns:p14="http://schemas.microsoft.com/office/powerpoint/2010/main" xmlns="" val="2032501331"/>
+                <p14:modId xmlns:p14="http://schemas.microsoft.com/office/powerpoint/2010/main" val="2032501331"/>
               </p:ext>
             </p:extLst>
           </p:nvPr>
@@ -16555,17 +16673,86 @@
         <p:spPr>
           <a:xfrm>
             <a:off x="381000" y="1772816"/>
-            <a:ext cx="8382000" cy="984885"/>
+            <a:ext cx="8382000" cy="4924425"/>
           </a:xfrm>
         </p:spPr>
         <p:txBody>
           <a:bodyPr/>
           <a:lstStyle/>
           <a:p>
-            <a:r>
-              <a:rPr lang="de-DE" dirty="0" smtClean="0"/>
-              <a:t>Vorstellung des Projektteams</a:t>
-            </a:r>
+            <a:pPr marL="0" indent="0">
+              <a:buNone/>
+            </a:pPr>
+            <a:r>
+              <a:rPr lang="de-DE" b="1" dirty="0"/>
+              <a:t>Team Schwarz:</a:t>
+            </a:r>
+          </a:p>
+          <a:p>
+            <a:r>
+              <a:rPr lang="de-DE" dirty="0"/>
+              <a:t>Nadine Feldmann: Anwendungsentwicklerin bei </a:t>
+            </a:r>
+            <a:r>
+              <a:rPr lang="de-DE" dirty="0" err="1"/>
+              <a:t>GuideCom</a:t>
+            </a:r>
+            <a:r>
+              <a:rPr lang="de-DE" dirty="0"/>
+              <a:t> GmbH, Münster</a:t>
+            </a:r>
+          </a:p>
+          <a:p>
+            <a:r>
+              <a:rPr lang="de-DE" dirty="0"/>
+              <a:t> Lukas Huwe: Anwendungsentwickler bei </a:t>
+            </a:r>
+            <a:r>
+              <a:rPr lang="de-DE" dirty="0" err="1"/>
+              <a:t>GuideCom</a:t>
+            </a:r>
+            <a:r>
+              <a:rPr lang="de-DE" dirty="0"/>
+              <a:t> GmbH, Münster</a:t>
+            </a:r>
+          </a:p>
+          <a:p>
+            <a:r>
+              <a:rPr lang="de-DE" dirty="0"/>
+              <a:t>Michael Kerkhoff: Anwendungsentwickler bei </a:t>
+            </a:r>
+            <a:r>
+              <a:rPr lang="de-DE" dirty="0" err="1"/>
+              <a:t>d.velop</a:t>
+            </a:r>
+            <a:r>
+              <a:rPr lang="de-DE" dirty="0"/>
+              <a:t> AG, </a:t>
+            </a:r>
+            <a:r>
+              <a:rPr lang="de-DE" dirty="0" err="1"/>
+              <a:t>Gescher</a:t>
+            </a:r>
+            <a:endParaRPr lang="de-DE" dirty="0"/>
+          </a:p>
+          <a:p>
+            <a:r>
+              <a:rPr lang="de-DE" dirty="0"/>
+              <a:t>Sebastian Ochtrup: Anwendungsentwickler bei </a:t>
+            </a:r>
+            <a:r>
+              <a:rPr lang="de-DE" dirty="0" err="1"/>
+              <a:t>d.velop</a:t>
+            </a:r>
+            <a:r>
+              <a:rPr lang="de-DE" dirty="0"/>
+              <a:t> AG, </a:t>
+            </a:r>
+            <a:r>
+              <a:rPr lang="de-DE" dirty="0" err="1" smtClean="0"/>
+              <a:t>Gescher</a:t>
+            </a:r>
+            <a:endParaRPr lang="de-DE" dirty="0" smtClean="0"/>
           </a:p>
           <a:p>
             <a:pPr marL="0" indent="0">
@@ -16648,7 +16835,7 @@
     </p:spTree>
     <p:extLst>
       <p:ext uri="{BB962C8B-B14F-4D97-AF65-F5344CB8AC3E}">
-        <p14:creationId xmlns:p14="http://schemas.microsoft.com/office/powerpoint/2010/main" xmlns="" val="493528735"/>
+        <p14:creationId xmlns:p14="http://schemas.microsoft.com/office/powerpoint/2010/main" val="493528735"/>
       </p:ext>
     </p:extLst>
   </p:cSld>
@@ -16881,7 +17068,7 @@
     </p:spTree>
     <p:extLst>
       <p:ext uri="{BB962C8B-B14F-4D97-AF65-F5344CB8AC3E}">
-        <p14:creationId xmlns:p14="http://schemas.microsoft.com/office/powerpoint/2010/main" xmlns="" val="4010490588"/>
+        <p14:creationId xmlns:p14="http://schemas.microsoft.com/office/powerpoint/2010/main" val="4010490588"/>
       </p:ext>
     </p:extLst>
   </p:cSld>
@@ -16952,7 +17139,7 @@
         <p:spPr>
           <a:xfrm>
             <a:off x="381000" y="1772816"/>
-            <a:ext cx="8382000" cy="1428083"/>
+            <a:ext cx="8382000" cy="2948499"/>
           </a:xfrm>
         </p:spPr>
         <p:txBody>
@@ -16960,17 +17147,41 @@
           <a:lstStyle/>
           <a:p>
             <a:r>
+              <a:rPr lang="de-DE" dirty="0"/>
+              <a:t>„Essential Blog“: </a:t>
+            </a:r>
+          </a:p>
+          <a:p>
+            <a:pPr lvl="1"/>
+            <a:r>
+              <a:rPr lang="de-DE" dirty="0"/>
+              <a:t>Blog-Webseite mit rudimentären Funktionen</a:t>
+            </a:r>
+          </a:p>
+          <a:p>
+            <a:r>
+              <a:rPr lang="de-DE" dirty="0"/>
+              <a:t>Warum? </a:t>
+            </a:r>
+          </a:p>
+          <a:p>
+            <a:pPr lvl="1"/>
+            <a:r>
+              <a:rPr lang="de-DE" dirty="0"/>
+              <a:t>Alltagsbezogen</a:t>
+            </a:r>
+          </a:p>
+          <a:p>
+            <a:pPr lvl="1"/>
+            <a:r>
+              <a:rPr lang="de-DE" dirty="0"/>
+              <a:t>beliebig erweiterbar</a:t>
+            </a:r>
+          </a:p>
+          <a:p>
+            <a:r>
               <a:rPr lang="de-DE" dirty="0" smtClean="0"/>
-              <a:t>Einführung des Themas</a:t>
-            </a:r>
-          </a:p>
-          <a:p>
-            <a:pPr marL="0" indent="0">
-              <a:buNone/>
-            </a:pPr>
-            <a:r>
-              <a:rPr lang="de-DE" dirty="0" smtClean="0"/>
-              <a:t>-&gt; Worum geht es in dem Projekt? Warum dieses Thema? Welche Technologien?</a:t>
+              <a:t>Technologien:</a:t>
             </a:r>
             <a:endParaRPr lang="de-DE" dirty="0"/>
           </a:p>
@@ -17046,10 +17257,118 @@
           </a:p>
         </p:txBody>
       </p:sp>
+      <p:graphicFrame>
+        <p:nvGraphicFramePr>
+          <p:cNvPr id="7" name="Tabelle 6"/>
+          <p:cNvGraphicFramePr>
+            <a:graphicFrameLocks noGrp="1"/>
+          </p:cNvGraphicFramePr>
+          <p:nvPr>
+            <p:extLst>
+              <p:ext uri="{D42A27DB-BD31-4B8C-83A1-F6EECF244321}">
+                <p14:modId xmlns:p14="http://schemas.microsoft.com/office/powerpoint/2010/main" val="2095885831"/>
+              </p:ext>
+            </p:extLst>
+          </p:nvPr>
+        </p:nvGraphicFramePr>
+        <p:xfrm>
+          <a:off x="1043608" y="4742704"/>
+          <a:ext cx="6840760" cy="1371600"/>
+        </p:xfrm>
+        <a:graphic>
+          <a:graphicData uri="http://schemas.openxmlformats.org/drawingml/2006/table">
+            <a:tbl>
+              <a:tblPr firstRow="1" bandRow="1">
+                <a:tableStyleId>{2D5ABB26-0587-4C30-8999-92F81FD0307C}</a:tableStyleId>
+              </a:tblPr>
+              <a:tblGrid>
+                <a:gridCol w="3420380"/>
+                <a:gridCol w="3420380"/>
+              </a:tblGrid>
+              <a:tr h="370840">
+                <a:tc>
+                  <a:txBody>
+                    <a:bodyPr/>
+                    <a:lstStyle/>
+                    <a:p>
+                      <a:pPr marL="742932" lvl="1" indent="-285750">
+                        <a:buFont typeface="Arial" panose="020B0604020202020204" pitchFamily="34" charset="0"/>
+                        <a:buChar char="•"/>
+                      </a:pPr>
+                      <a:r>
+                        <a:rPr lang="de-DE" sz="2800" dirty="0" smtClean="0"/>
+                        <a:t>HTML</a:t>
+                      </a:r>
+                    </a:p>
+                    <a:p>
+                      <a:pPr marL="742932" lvl="1" indent="-285750">
+                        <a:buFont typeface="Arial" panose="020B0604020202020204" pitchFamily="34" charset="0"/>
+                        <a:buChar char="•"/>
+                      </a:pPr>
+                      <a:r>
+                        <a:rPr lang="de-DE" sz="2800" dirty="0" smtClean="0"/>
+                        <a:t>PHP</a:t>
+                      </a:r>
+                    </a:p>
+                    <a:p>
+                      <a:pPr marL="742932" lvl="1" indent="-285750">
+                        <a:buFont typeface="Arial" panose="020B0604020202020204" pitchFamily="34" charset="0"/>
+                        <a:buChar char="•"/>
+                      </a:pPr>
+                      <a:r>
+                        <a:rPr lang="de-DE" sz="2800" dirty="0" smtClean="0"/>
+                        <a:t>JavaScript</a:t>
+                      </a:r>
+                    </a:p>
+                  </a:txBody>
+                  <a:tcPr/>
+                </a:tc>
+                <a:tc>
+                  <a:txBody>
+                    <a:bodyPr/>
+                    <a:lstStyle/>
+                    <a:p>
+                      <a:pPr marL="742932" lvl="1" indent="-285750">
+                        <a:buFont typeface="Arial" panose="020B0604020202020204" pitchFamily="34" charset="0"/>
+                        <a:buChar char="•"/>
+                      </a:pPr>
+                      <a:r>
+                        <a:rPr lang="de-DE" sz="2800" dirty="0" smtClean="0"/>
+                        <a:t>CSS</a:t>
+                      </a:r>
+                    </a:p>
+                    <a:p>
+                      <a:pPr marL="742932" lvl="1" indent="-285750">
+                        <a:buFont typeface="Arial" panose="020B0604020202020204" pitchFamily="34" charset="0"/>
+                        <a:buChar char="•"/>
+                      </a:pPr>
+                      <a:r>
+                        <a:rPr lang="de-DE" sz="2800" dirty="0" smtClean="0"/>
+                        <a:t>Apache</a:t>
+                      </a:r>
+                    </a:p>
+                    <a:p>
+                      <a:pPr marL="742932" lvl="1" indent="-285750">
+                        <a:buFont typeface="Arial" panose="020B0604020202020204" pitchFamily="34" charset="0"/>
+                        <a:buChar char="•"/>
+                      </a:pPr>
+                      <a:r>
+                        <a:rPr lang="de-DE" sz="2800" dirty="0" smtClean="0"/>
+                        <a:t>MySQL</a:t>
+                      </a:r>
+                    </a:p>
+                  </a:txBody>
+                  <a:tcPr/>
+                </a:tc>
+              </a:tr>
+            </a:tbl>
+          </a:graphicData>
+        </a:graphic>
+      </p:graphicFrame>
     </p:spTree>
     <p:extLst>
       <p:ext uri="{BB962C8B-B14F-4D97-AF65-F5344CB8AC3E}">
-        <p14:creationId xmlns:p14="http://schemas.microsoft.com/office/powerpoint/2010/main" xmlns="" val="4283785290"/>
+        <p14:creationId xmlns:p14="http://schemas.microsoft.com/office/powerpoint/2010/main" val="4283785290"/>
       </p:ext>
     </p:extLst>
   </p:cSld>
@@ -17282,7 +17601,7 @@
     </p:spTree>
     <p:extLst>
       <p:ext uri="{BB962C8B-B14F-4D97-AF65-F5344CB8AC3E}">
-        <p14:creationId xmlns:p14="http://schemas.microsoft.com/office/powerpoint/2010/main" xmlns="" val="963295622"/>
+        <p14:creationId xmlns:p14="http://schemas.microsoft.com/office/powerpoint/2010/main" val="963295622"/>
       </p:ext>
     </p:extLst>
   </p:cSld>
@@ -17353,7 +17672,7 @@
         <p:spPr>
           <a:xfrm>
             <a:off x="381000" y="1772816"/>
-            <a:ext cx="8382000" cy="4050340"/>
+            <a:ext cx="8382000" cy="4502771"/>
           </a:xfrm>
         </p:spPr>
         <p:txBody>
@@ -17364,180 +17683,170 @@
               <a:buNone/>
             </a:pPr>
             <a:r>
-              <a:rPr lang="de-DE" sz="1600" b="1" dirty="0" smtClean="0"/>
-              <a:t>Anforderungen/ Pflichtenheft: Was hatten Sie sich vorgenommen? Was war optional?</a:t>
-            </a:r>
+              <a:rPr lang="de-DE" sz="1800" b="1" dirty="0"/>
+              <a:t>Funktionen:</a:t>
+            </a:r>
+          </a:p>
+          <a:p>
+            <a:pPr>
+              <a:buFont typeface="Arial" panose="020B0604020202020204" pitchFamily="34" charset="0"/>
+              <a:buChar char="•"/>
+            </a:pPr>
+            <a:r>
+              <a:rPr lang="de-DE" sz="1600" dirty="0"/>
+              <a:t>beim Öffnen der Seite Anzeige der Beiträge, Kommentare aufklappbar</a:t>
+            </a:r>
+          </a:p>
+          <a:p>
+            <a:pPr>
+              <a:buFont typeface="Arial" panose="020B0604020202020204" pitchFamily="34" charset="0"/>
+              <a:buChar char="•"/>
+            </a:pPr>
+            <a:r>
+              <a:rPr lang="de-DE" sz="1600" dirty="0"/>
+              <a:t>Erfassen von neuen Blog-Einträgen</a:t>
+            </a:r>
+          </a:p>
+          <a:p>
+            <a:pPr>
+              <a:buFont typeface="Arial" panose="020B0604020202020204" pitchFamily="34" charset="0"/>
+              <a:buChar char="•"/>
+            </a:pPr>
+            <a:r>
+              <a:rPr lang="de-DE" sz="1600" dirty="0"/>
+              <a:t>Kommentar-Funktion</a:t>
+            </a:r>
+          </a:p>
+          <a:p>
+            <a:pPr>
+              <a:buFont typeface="Arial" panose="020B0604020202020204" pitchFamily="34" charset="0"/>
+              <a:buChar char="•"/>
+            </a:pPr>
+            <a:r>
+              <a:rPr lang="de-DE" sz="1600" dirty="0"/>
+              <a:t>Speichern der Beiträge &amp; Kommentare in einer Datenbank</a:t>
+            </a:r>
+          </a:p>
+          <a:p>
+            <a:pPr>
+              <a:buFont typeface="Arial" panose="020B0604020202020204" pitchFamily="34" charset="0"/>
+              <a:buChar char="•"/>
+            </a:pPr>
+            <a:r>
+              <a:rPr lang="de-DE" sz="1600" dirty="0"/>
+              <a:t>Hitcounter</a:t>
+            </a:r>
+            <a:br>
+              <a:rPr lang="de-DE" sz="1600" dirty="0"/>
+            </a:br>
+            <a:endParaRPr lang="de-DE" sz="1600" dirty="0"/>
           </a:p>
           <a:p>
             <a:pPr marL="0" indent="0">
               <a:buNone/>
             </a:pPr>
             <a:r>
-              <a:rPr lang="de-DE" sz="1400" i="1" dirty="0" smtClean="0"/>
-              <a:t>Funktionen</a:t>
-            </a:r>
-            <a:r>
-              <a:rPr lang="de-DE" sz="1400" dirty="0" smtClean="0"/>
-              <a:t>:</a:t>
-            </a:r>
-            <a:endParaRPr lang="de-DE" sz="1400" dirty="0"/>
+              <a:rPr lang="de-DE" sz="1800" b="1" dirty="0" err="1"/>
+              <a:t>nice</a:t>
+            </a:r>
+            <a:r>
+              <a:rPr lang="de-DE" sz="1800" b="1" dirty="0"/>
+              <a:t> </a:t>
+            </a:r>
+            <a:r>
+              <a:rPr lang="de-DE" sz="1800" b="1" dirty="0" err="1"/>
+              <a:t>to</a:t>
+            </a:r>
+            <a:r>
+              <a:rPr lang="de-DE" sz="1800" b="1" dirty="0"/>
+              <a:t> </a:t>
+            </a:r>
+            <a:r>
+              <a:rPr lang="de-DE" sz="1800" b="1" dirty="0" err="1"/>
+              <a:t>have</a:t>
+            </a:r>
+            <a:r>
+              <a:rPr lang="de-DE" sz="1800" b="1" dirty="0"/>
+              <a:t> (wenn die Zeit reicht):</a:t>
+            </a:r>
+          </a:p>
+          <a:p>
+            <a:pPr>
+              <a:buFont typeface="Arial" panose="020B0604020202020204" pitchFamily="34" charset="0"/>
+              <a:buChar char="•"/>
+            </a:pPr>
+            <a:r>
+              <a:rPr lang="de-DE" sz="1600" dirty="0"/>
+              <a:t>Sprachfiles hinterlegen: Switch zwischen Deutsch &amp; Englisch (nur harte Seiteninhalte) ermöglichen</a:t>
+            </a:r>
+          </a:p>
+          <a:p>
+            <a:pPr>
+              <a:buFont typeface="Arial" panose="020B0604020202020204" pitchFamily="34" charset="0"/>
+              <a:buChar char="•"/>
+            </a:pPr>
+            <a:r>
+              <a:rPr lang="de-DE" sz="1600" dirty="0"/>
+              <a:t>Einbinden von Bildern in die Beiträge</a:t>
+            </a:r>
+            <a:br>
+              <a:rPr lang="de-DE" sz="1600" dirty="0"/>
+            </a:br>
+            <a:endParaRPr lang="de-DE" sz="1600" dirty="0"/>
           </a:p>
           <a:p>
             <a:pPr marL="0" indent="0">
               <a:buNone/>
             </a:pPr>
             <a:r>
-              <a:rPr lang="de-DE" sz="1400" dirty="0"/>
-              <a:t>- beim Öffnen der Seite Anzeige der Beiträge, Kommentare aufklappbar</a:t>
-            </a:r>
-            <a:br>
-              <a:rPr lang="de-DE" sz="1400" dirty="0"/>
-            </a:br>
-            <a:r>
-              <a:rPr lang="de-DE" sz="1400" dirty="0"/>
-              <a:t>- Erfassen von neuen Blog-Einträgen</a:t>
-            </a:r>
-          </a:p>
-          <a:p>
-            <a:pPr marL="0" indent="0">
-              <a:buNone/>
+              <a:rPr lang="de-DE" sz="1800" b="1" dirty="0"/>
+              <a:t>Abgrenzungskriterien:</a:t>
+            </a:r>
+          </a:p>
+          <a:p>
+            <a:pPr>
+              <a:buFont typeface="Arial" panose="020B0604020202020204" pitchFamily="34" charset="0"/>
+              <a:buChar char="•"/>
             </a:pPr>
             <a:r>
-              <a:rPr lang="de-DE" sz="1400" dirty="0"/>
-              <a:t>- Kommentar-Funktion</a:t>
-            </a:r>
-          </a:p>
-          <a:p>
-            <a:pPr marL="0" indent="0">
-              <a:buNone/>
+              <a:rPr lang="de-DE" sz="1600" dirty="0"/>
+              <a:t>kein Editieren von Einträgen</a:t>
+            </a:r>
+          </a:p>
+          <a:p>
+            <a:pPr>
+              <a:buFont typeface="Arial" panose="020B0604020202020204" pitchFamily="34" charset="0"/>
+              <a:buChar char="•"/>
             </a:pPr>
             <a:r>
-              <a:rPr lang="de-DE" sz="1400" dirty="0"/>
-              <a:t>- Speichern der Beiträge &amp; Kommentare in einer Datenbank</a:t>
-            </a:r>
-          </a:p>
-          <a:p>
-            <a:pPr marL="0" indent="0">
-              <a:buNone/>
+              <a:rPr lang="de-DE" sz="1600" dirty="0"/>
+              <a:t>kein Löschen von Einträgen</a:t>
+            </a:r>
+          </a:p>
+          <a:p>
+            <a:pPr>
+              <a:buFont typeface="Arial" panose="020B0604020202020204" pitchFamily="34" charset="0"/>
+              <a:buChar char="•"/>
             </a:pPr>
             <a:r>
-              <a:rPr lang="de-DE" sz="1400" dirty="0"/>
-              <a:t>- Hitcounter</a:t>
-            </a:r>
-            <a:br>
-              <a:rPr lang="de-DE" sz="1400" dirty="0"/>
-            </a:br>
-            <a:endParaRPr lang="de-DE" sz="1400" dirty="0"/>
-          </a:p>
-          <a:p>
-            <a:pPr marL="0" indent="0">
-              <a:buNone/>
+              <a:rPr lang="de-DE" sz="1600" dirty="0"/>
+              <a:t>keine Benutzerverwaltung</a:t>
+            </a:r>
+          </a:p>
+          <a:p>
+            <a:pPr>
+              <a:buFont typeface="Arial" panose="020B0604020202020204" pitchFamily="34" charset="0"/>
+              <a:buChar char="•"/>
             </a:pPr>
             <a:r>
-              <a:rPr lang="de-DE" sz="1400" i="1" dirty="0" err="1"/>
-              <a:t>nice</a:t>
-            </a:r>
-            <a:r>
-              <a:rPr lang="de-DE" sz="1400" i="1" dirty="0"/>
-              <a:t> </a:t>
-            </a:r>
-            <a:r>
-              <a:rPr lang="de-DE" sz="1400" i="1" dirty="0" err="1"/>
-              <a:t>to</a:t>
-            </a:r>
-            <a:r>
-              <a:rPr lang="de-DE" sz="1400" i="1" dirty="0"/>
-              <a:t> </a:t>
-            </a:r>
-            <a:r>
-              <a:rPr lang="de-DE" sz="1400" i="1" dirty="0" err="1"/>
-              <a:t>have</a:t>
-            </a:r>
-            <a:r>
-              <a:rPr lang="de-DE" sz="1400" i="1" dirty="0"/>
-              <a:t> (wenn die Zeit reicht):</a:t>
-            </a:r>
-            <a:endParaRPr lang="de-DE" sz="1400" dirty="0"/>
-          </a:p>
-          <a:p>
-            <a:pPr marL="0" indent="0">
-              <a:buNone/>
-            </a:pPr>
-            <a:r>
-              <a:rPr lang="de-DE" sz="1400" dirty="0"/>
-              <a:t>- Sprachfiles hinterlegen: Switch zwischen Deutsch &amp; Englisch (nur harte Seiteninhalte) ermöglichen</a:t>
-            </a:r>
-          </a:p>
-          <a:p>
-            <a:pPr marL="0" indent="0">
-              <a:buNone/>
-            </a:pPr>
-            <a:r>
-              <a:rPr lang="de-DE" sz="1400" dirty="0"/>
-              <a:t>- Einbinden von Bildern in die Beiträge</a:t>
-            </a:r>
-            <a:br>
-              <a:rPr lang="de-DE" sz="1400" dirty="0"/>
-            </a:br>
-            <a:r>
-              <a:rPr lang="de-DE" sz="1400" dirty="0"/>
-              <a:t/>
-            </a:r>
-            <a:br>
-              <a:rPr lang="de-DE" sz="1400" dirty="0"/>
-            </a:br>
-            <a:endParaRPr lang="de-DE" sz="1400" dirty="0"/>
-          </a:p>
-          <a:p>
-            <a:pPr marL="0" indent="0">
-              <a:buNone/>
-            </a:pPr>
-            <a:r>
-              <a:rPr lang="de-DE" sz="1400" i="1" dirty="0"/>
-              <a:t>Abgrenzungskriterien:</a:t>
-            </a:r>
-            <a:endParaRPr lang="de-DE" sz="1400" dirty="0"/>
-          </a:p>
-          <a:p>
-            <a:pPr marL="0" indent="0">
-              <a:buNone/>
-            </a:pPr>
-            <a:r>
-              <a:rPr lang="de-DE" sz="1400" dirty="0"/>
-              <a:t>- kein Editieren von Einträgen</a:t>
-            </a:r>
-          </a:p>
-          <a:p>
-            <a:pPr marL="0" indent="0">
-              <a:buNone/>
-            </a:pPr>
-            <a:r>
-              <a:rPr lang="de-DE" sz="1400" dirty="0"/>
-              <a:t>- kein Löschen von Einträgen</a:t>
-            </a:r>
-          </a:p>
-          <a:p>
-            <a:pPr marL="0" indent="0">
-              <a:buNone/>
-            </a:pPr>
-            <a:r>
-              <a:rPr lang="de-DE" sz="1400" dirty="0"/>
-              <a:t>- keine Benutzerverwaltung</a:t>
-            </a:r>
-          </a:p>
-          <a:p>
-            <a:pPr marL="0" indent="0">
-              <a:buNone/>
-            </a:pPr>
-            <a:r>
-              <a:rPr lang="de-DE" sz="1400" dirty="0"/>
-              <a:t>- keine </a:t>
-            </a:r>
-            <a:r>
-              <a:rPr lang="de-DE" sz="1400" dirty="0" smtClean="0"/>
+              <a:rPr lang="de-DE" sz="1600" dirty="0"/>
+              <a:t>keine </a:t>
+            </a:r>
+            <a:r>
+              <a:rPr lang="de-DE" sz="1600" dirty="0" smtClean="0"/>
               <a:t>Suchfunktion</a:t>
             </a:r>
-            <a:endParaRPr lang="de-DE" sz="1400" dirty="0"/>
+            <a:endParaRPr lang="de-DE" sz="1600" dirty="0"/>
           </a:p>
         </p:txBody>
       </p:sp>
@@ -17614,7 +17923,7 @@
     </p:spTree>
     <p:extLst>
       <p:ext uri="{BB962C8B-B14F-4D97-AF65-F5344CB8AC3E}">
-        <p14:creationId xmlns:p14="http://schemas.microsoft.com/office/powerpoint/2010/main" xmlns="" val="1102019178"/>
+        <p14:creationId xmlns:p14="http://schemas.microsoft.com/office/powerpoint/2010/main" val="1102019178"/>
       </p:ext>
     </p:extLst>
   </p:cSld>
@@ -17847,7 +18156,7 @@
     </p:spTree>
     <p:extLst>
       <p:ext uri="{BB962C8B-B14F-4D97-AF65-F5344CB8AC3E}">
-        <p14:creationId xmlns:p14="http://schemas.microsoft.com/office/powerpoint/2010/main" xmlns="" val="1788390056"/>
+        <p14:creationId xmlns:p14="http://schemas.microsoft.com/office/powerpoint/2010/main" val="1788390056"/>
       </p:ext>
     </p:extLst>
   </p:cSld>

</xml_diff>

<commit_message>
Präsi angepasst (Texte höher geschoben)
</commit_message>
<xml_diff>
--- a/Notizen/Präsentation_EssentialBlog.pptx
+++ b/Notizen/Präsentation_EssentialBlog.pptx
@@ -3913,7 +3913,7 @@
               <a:pPr algn="r" defTabSz="914400">
                 <a:buNone/>
               </a:pPr>
-              <a:t>1/26/2015 8:08 PM</a:t>
+              <a:t>1/26/2015 9:34 PM</a:t>
             </a:fld>
             <a:endParaRPr lang="en-US" sz="1200" b="0" i="0">
               <a:latin typeface="Calibri"/>
@@ -9486,11 +9486,7 @@
           <a:p>
             <a:r>
               <a:rPr lang="de-DE" dirty="0" smtClean="0"/>
-              <a:t>Kick-Off </a:t>
-            </a:r>
-            <a:r>
-              <a:rPr lang="de-DE" dirty="0" smtClean="0"/>
-              <a:t>am 28.11.2014</a:t>
+              <a:t>Kick-Off am 28.11.2014</a:t>
             </a:r>
           </a:p>
           <a:p>
@@ -9502,15 +9498,7 @@
           <a:p>
             <a:r>
               <a:rPr lang="de-DE" dirty="0" smtClean="0"/>
-              <a:t>Vertikaler </a:t>
-            </a:r>
-            <a:r>
-              <a:rPr lang="de-DE" dirty="0" smtClean="0"/>
-              <a:t>Durchstich bis </a:t>
-            </a:r>
-            <a:r>
-              <a:rPr lang="de-DE" dirty="0" smtClean="0"/>
-              <a:t>zum </a:t>
+              <a:t>Vertikaler Durchstich bis zum </a:t>
             </a:r>
             <a:r>
               <a:rPr lang="de-DE" b="1" dirty="0" smtClean="0"/>
@@ -9789,7 +9777,7 @@
         </p:nvSpPr>
         <p:spPr>
           <a:xfrm>
-            <a:off x="467544" y="4653136"/>
+            <a:off x="377889" y="4161482"/>
             <a:ext cx="8208912" cy="1200329"/>
           </a:xfrm>
           <a:prstGeom prst="rect">
@@ -9857,15 +9845,7 @@
                   <a:srgbClr val="FF0000"/>
                 </a:solidFill>
               </a:rPr>
-              <a:t>Kick-Off </a:t>
-            </a:r>
-            <a:r>
-              <a:rPr lang="de-DE" sz="2000" b="1" dirty="0" smtClean="0">
-                <a:solidFill>
-                  <a:srgbClr val="FF0000"/>
-                </a:solidFill>
-              </a:rPr>
-              <a:t>(Alle)</a:t>
+              <a:t>Kick-Off (Alle)</a:t>
             </a:r>
             <a:endParaRPr lang="de-DE" sz="2000" b="1" dirty="0">
               <a:solidFill>
@@ -9897,11 +9877,7 @@
           <a:p>
             <a:r>
               <a:rPr lang="de-DE" dirty="0" smtClean="0"/>
-              <a:t>Kick-Off </a:t>
-            </a:r>
-            <a:r>
-              <a:rPr lang="de-DE" dirty="0" smtClean="0"/>
-              <a:t>–&gt; Prototyp</a:t>
+              <a:t>Kick-Off –&gt; Prototyp</a:t>
             </a:r>
             <a:endParaRPr lang="de-DE" dirty="0"/>
           </a:p>
@@ -10197,11 +10173,7 @@
           <a:p>
             <a:r>
               <a:rPr lang="de-DE" dirty="0" smtClean="0"/>
-              <a:t>Kick-Off </a:t>
-            </a:r>
-            <a:r>
-              <a:rPr lang="de-DE" dirty="0" smtClean="0"/>
-              <a:t>–&gt; Prototyp</a:t>
+              <a:t>Kick-Off –&gt; Prototyp</a:t>
             </a:r>
             <a:endParaRPr lang="de-DE" dirty="0"/>
           </a:p>
@@ -10345,7 +10317,7 @@
         </p:nvSpPr>
         <p:spPr>
           <a:xfrm>
-            <a:off x="467544" y="4653136"/>
+            <a:off x="381000" y="4325034"/>
             <a:ext cx="8208912" cy="646331"/>
           </a:xfrm>
           <a:prstGeom prst="rect">
@@ -10660,7 +10632,7 @@
         </p:nvSpPr>
         <p:spPr>
           <a:xfrm>
-            <a:off x="467544" y="4653136"/>
+            <a:off x="323528" y="4289963"/>
             <a:ext cx="8208912" cy="1200329"/>
           </a:xfrm>
           <a:prstGeom prst="rect">
@@ -10754,11 +10726,7 @@
           <a:p>
             <a:r>
               <a:rPr lang="de-DE" dirty="0" smtClean="0"/>
-              <a:t>Kick-Off </a:t>
-            </a:r>
-            <a:r>
-              <a:rPr lang="de-DE" dirty="0" smtClean="0"/>
-              <a:t>–&gt; Prototyp</a:t>
+              <a:t>Kick-Off –&gt; Prototyp</a:t>
             </a:r>
             <a:endParaRPr lang="de-DE" dirty="0"/>
           </a:p>
@@ -11013,7 +10981,7 @@
         </p:nvSpPr>
         <p:spPr>
           <a:xfrm>
-            <a:off x="467544" y="4797152"/>
+            <a:off x="381000" y="4303351"/>
             <a:ext cx="8208912" cy="923330"/>
           </a:xfrm>
           <a:prstGeom prst="rect">
@@ -11108,11 +11076,7 @@
           <a:p>
             <a:r>
               <a:rPr lang="de-DE" dirty="0" smtClean="0"/>
-              <a:t>Kick-Off </a:t>
-            </a:r>
-            <a:r>
-              <a:rPr lang="de-DE" dirty="0" smtClean="0"/>
-              <a:t>–&gt; Prototyp</a:t>
+              <a:t>Kick-Off –&gt; Prototyp</a:t>
             </a:r>
             <a:endParaRPr lang="de-DE" dirty="0"/>
           </a:p>
@@ -11367,7 +11331,7 @@
         </p:nvSpPr>
         <p:spPr>
           <a:xfrm>
-            <a:off x="467544" y="4797152"/>
+            <a:off x="312207" y="4253026"/>
             <a:ext cx="8208912" cy="1200329"/>
           </a:xfrm>
           <a:prstGeom prst="rect">
@@ -11397,15 +11361,7 @@
             </a:pPr>
             <a:r>
               <a:rPr lang="de-DE" dirty="0" smtClean="0"/>
-              <a:t> </a:t>
-            </a:r>
-            <a:r>
-              <a:rPr lang="de-DE" dirty="0" smtClean="0"/>
-              <a:t>JavaScript-Funktion </a:t>
-            </a:r>
-            <a:r>
-              <a:rPr lang="de-DE" dirty="0" smtClean="0"/>
-              <a:t>zum Anzeigen und Verstecken von Kommentaren implementiert</a:t>
+              <a:t> JavaScript-Funktion zum Anzeigen und Verstecken von Kommentaren implementiert</a:t>
             </a:r>
           </a:p>
           <a:p>
@@ -11458,23 +11414,7 @@
                   <a:srgbClr val="FF0000"/>
                 </a:solidFill>
               </a:rPr>
-              <a:t>Erstellung der </a:t>
-            </a:r>
-            <a:r>
-              <a:rPr lang="de-DE" sz="2000" b="1" dirty="0" smtClean="0">
-                <a:solidFill>
-                  <a:srgbClr val="FF0000"/>
-                </a:solidFill>
-              </a:rPr>
-              <a:t>JavaScript-Funktionen </a:t>
-            </a:r>
-            <a:r>
-              <a:rPr lang="de-DE" sz="2000" b="1" dirty="0" smtClean="0">
-                <a:solidFill>
-                  <a:srgbClr val="FF0000"/>
-                </a:solidFill>
-              </a:rPr>
-              <a:t>(Michael)</a:t>
+              <a:t>Erstellung der JavaScript-Funktionen (Michael)</a:t>
             </a:r>
             <a:endParaRPr lang="de-DE" sz="2000" b="1" dirty="0">
               <a:solidFill>
@@ -11506,11 +11446,7 @@
           <a:p>
             <a:r>
               <a:rPr lang="de-DE" dirty="0" smtClean="0"/>
-              <a:t>Kick-Off </a:t>
-            </a:r>
-            <a:r>
-              <a:rPr lang="de-DE" dirty="0" smtClean="0"/>
-              <a:t>–&gt; Prototyp</a:t>
+              <a:t>Kick-Off –&gt; Prototyp</a:t>
             </a:r>
             <a:endParaRPr lang="de-DE" dirty="0"/>
           </a:p>
@@ -11819,11 +11755,7 @@
           <a:p>
             <a:r>
               <a:rPr lang="de-DE" dirty="0" smtClean="0"/>
-              <a:t>Kick-Off </a:t>
-            </a:r>
-            <a:r>
-              <a:rPr lang="de-DE" dirty="0" smtClean="0"/>
-              <a:t>–&gt; Prototyp</a:t>
+              <a:t>Kick-Off –&gt; Prototyp</a:t>
             </a:r>
             <a:endParaRPr lang="de-DE" dirty="0"/>
           </a:p>
@@ -12144,7 +12076,7 @@
         </p:nvSpPr>
         <p:spPr>
           <a:xfrm>
-            <a:off x="467544" y="4725144"/>
+            <a:off x="381000" y="4253026"/>
             <a:ext cx="8208912" cy="923330"/>
           </a:xfrm>
           <a:prstGeom prst="rect">
@@ -12164,8 +12096,13 @@
             </a:pPr>
             <a:r>
               <a:rPr lang="de-DE" dirty="0" smtClean="0"/>
-              <a:t> Verbleibende PHP-Funktionen umsetzen</a:t>
-            </a:r>
+              <a:t> Verbleibende PHP-Funktionen </a:t>
+            </a:r>
+            <a:r>
+              <a:rPr lang="de-DE" dirty="0" smtClean="0"/>
+              <a:t>umgesetzt</a:t>
+            </a:r>
+            <a:endParaRPr lang="de-DE" dirty="0" smtClean="0"/>
           </a:p>
           <a:p>
             <a:pPr>
@@ -12174,8 +12111,13 @@
             </a:pPr>
             <a:r>
               <a:rPr lang="de-DE" dirty="0" smtClean="0"/>
-              <a:t> Design aufarbeiten</a:t>
-            </a:r>
+              <a:t> Design </a:t>
+            </a:r>
+            <a:r>
+              <a:rPr lang="de-DE" dirty="0" smtClean="0"/>
+              <a:t>aufgearbeitet</a:t>
+            </a:r>
+            <a:endParaRPr lang="de-DE" dirty="0" smtClean="0"/>
           </a:p>
           <a:p>
             <a:pPr>
@@ -12184,8 +12126,13 @@
             </a:pPr>
             <a:r>
               <a:rPr lang="de-DE" dirty="0" smtClean="0"/>
-              <a:t> Demo-Daten erstellen</a:t>
-            </a:r>
+              <a:t> Demo-Daten </a:t>
+            </a:r>
+            <a:r>
+              <a:rPr lang="de-DE" dirty="0" smtClean="0"/>
+              <a:t>erstellt</a:t>
+            </a:r>
+            <a:endParaRPr lang="de-DE" dirty="0" smtClean="0"/>
           </a:p>
         </p:txBody>
       </p:sp>
@@ -12360,7 +12307,6 @@
               <a:rPr lang="de-DE" dirty="0" smtClean="0"/>
               <a:t>Team </a:t>
             </a:r>
-            <a:endParaRPr lang="de-DE" dirty="0" smtClean="0"/>
           </a:p>
           <a:p>
             <a:pPr marL="514350" indent="-514350">
@@ -12369,11 +12315,7 @@
             </a:pPr>
             <a:r>
               <a:rPr lang="de-DE" dirty="0" smtClean="0"/>
-              <a:t>Unser </a:t>
-            </a:r>
-            <a:r>
-              <a:rPr lang="de-DE" dirty="0" smtClean="0"/>
-              <a:t>Thema </a:t>
+              <a:t>Unser Thema </a:t>
             </a:r>
             <a:endParaRPr lang="de-DE" dirty="0"/>
           </a:p>
@@ -12430,7 +12372,6 @@
               <a:rPr lang="de-DE" dirty="0" smtClean="0"/>
               <a:t>Reflektion </a:t>
             </a:r>
-            <a:endParaRPr lang="de-DE" dirty="0" smtClean="0"/>
           </a:p>
           <a:p>
             <a:pPr marL="514350" indent="-514350">
@@ -12693,7 +12634,7 @@
         </p:nvSpPr>
         <p:spPr>
           <a:xfrm>
-            <a:off x="467544" y="4725144"/>
+            <a:off x="362811" y="4325034"/>
             <a:ext cx="8208912" cy="923330"/>
           </a:xfrm>
           <a:prstGeom prst="rect">
@@ -13041,7 +12982,7 @@
         </p:nvSpPr>
         <p:spPr>
           <a:xfrm>
-            <a:off x="467544" y="5013176"/>
+            <a:off x="381000" y="4325034"/>
             <a:ext cx="8208912" cy="369332"/>
           </a:xfrm>
           <a:prstGeom prst="rect">
@@ -13057,15 +12998,15 @@
           <a:p>
             <a:r>
               <a:rPr lang="de-DE" dirty="0" smtClean="0"/>
-              <a:t>- Erstellung eines Skripts zur </a:t>
+              <a:t>- </a:t>
             </a:r>
             <a:r>
               <a:rPr lang="de-DE" dirty="0" smtClean="0"/>
-              <a:t>Befüllen der </a:t>
+              <a:t>Erstellen </a:t>
             </a:r>
             <a:r>
               <a:rPr lang="de-DE" dirty="0" smtClean="0"/>
-              <a:t>Datenbank</a:t>
+              <a:t>eines Skripts zur Befüllen der Datenbank</a:t>
             </a:r>
           </a:p>
         </p:txBody>
@@ -13098,15 +13039,7 @@
                   <a:srgbClr val="FF0000"/>
                 </a:solidFill>
               </a:rPr>
-              <a:t>Befüllen </a:t>
-            </a:r>
-            <a:r>
-              <a:rPr lang="de-DE" sz="2000" b="1" dirty="0" smtClean="0">
-                <a:solidFill>
-                  <a:srgbClr val="FF0000"/>
-                </a:solidFill>
-              </a:rPr>
-              <a:t>der Datenbank mit Demo-Daten (Nadine)</a:t>
+              <a:t>Befüllen der Datenbank mit Demo-Daten (Nadine)</a:t>
             </a:r>
             <a:endParaRPr lang="de-DE" sz="2000" b="1" dirty="0">
               <a:solidFill>
@@ -13449,23 +13382,7 @@
                   <a:srgbClr val="FF0000"/>
                 </a:solidFill>
               </a:rPr>
-              <a:t>Aufwand: </a:t>
-            </a:r>
-            <a:r>
-              <a:rPr lang="de-DE" b="1" dirty="0" smtClean="0">
-                <a:solidFill>
-                  <a:srgbClr val="FF0000"/>
-                </a:solidFill>
-              </a:rPr>
-              <a:t>40 </a:t>
-            </a:r>
-            <a:r>
-              <a:rPr lang="de-DE" b="1" dirty="0" smtClean="0">
-                <a:solidFill>
-                  <a:srgbClr val="FF0000"/>
-                </a:solidFill>
-              </a:rPr>
-              <a:t>Stunden</a:t>
+              <a:t>Aufwand: 40 Stunden</a:t>
             </a:r>
             <a:endParaRPr lang="de-DE" b="1" dirty="0">
               <a:solidFill>
@@ -14507,67 +14424,7 @@
                   </a:outerShdw>
                 </a:effectLst>
               </a:rPr>
-              <a:t>D</a:t>
-            </a:r>
-            <a:r>
-              <a:rPr lang="de-DE" sz="10000" b="1" i="1" spc="-642" dirty="0">
-                <a:ln w="11430"/>
-                <a:gradFill>
-                  <a:gsLst>
-                    <a:gs pos="0">
-                      <a:srgbClr val="0066FF"/>
-                    </a:gs>
-                    <a:gs pos="28000">
-                      <a:srgbClr val="2E59B0"/>
-                    </a:gs>
-                    <a:gs pos="62000">
-                      <a:srgbClr val="2B395F"/>
-                    </a:gs>
-                    <a:gs pos="88000">
-                      <a:srgbClr val="000000"/>
-                    </a:gs>
-                  </a:gsLst>
-                  <a:lin ang="5400000"/>
-                </a:gradFill>
-                <a:effectLst>
-                  <a:outerShdw blurRad="50800" dist="39000" dir="5460000" algn="tl">
-                    <a:srgbClr val="000000">
-                      <a:alpha val="38000"/>
-                    </a:srgbClr>
-                  </a:outerShdw>
-                </a:effectLst>
-              </a:rPr>
-              <a:t>e</a:t>
-            </a:r>
-            <a:r>
-              <a:rPr lang="de-DE" sz="10000" b="1" i="1" spc="-642" dirty="0">
-                <a:ln w="11430"/>
-                <a:gradFill>
-                  <a:gsLst>
-                    <a:gs pos="0">
-                      <a:srgbClr val="0066FF"/>
-                    </a:gs>
-                    <a:gs pos="28000">
-                      <a:srgbClr val="2E59B0"/>
-                    </a:gs>
-                    <a:gs pos="62000">
-                      <a:srgbClr val="2B395F"/>
-                    </a:gs>
-                    <a:gs pos="88000">
-                      <a:srgbClr val="000000"/>
-                    </a:gs>
-                  </a:gsLst>
-                  <a:lin ang="5400000"/>
-                </a:gradFill>
-                <a:effectLst>
-                  <a:outerShdw blurRad="50800" dist="39000" dir="5460000" algn="tl">
-                    <a:srgbClr val="000000">
-                      <a:alpha val="38000"/>
-                    </a:srgbClr>
-                  </a:outerShdw>
-                </a:effectLst>
-              </a:rPr>
-              <a:t>mo</a:t>
+              <a:t>Demo</a:t>
             </a:r>
             <a:r>
               <a:rPr lang="de-DE" sz="10000" b="1" i="1" spc="-640" dirty="0" smtClean="0">

</xml_diff>